<commit_message>
update PPT 내용 수정
</commit_message>
<xml_diff>
--- a/Documnet/[최종]스크립트 언어 텀프로젝트 기획.pptx
+++ b/Documnet/[최종]스크립트 언어 텀프로젝트 기획.pptx
@@ -17,39 +17,38 @@
     <p:sldId id="269" r:id="rId11"/>
     <p:sldId id="270" r:id="rId12"/>
     <p:sldId id="259" r:id="rId13"/>
-    <p:sldId id="262" r:id="rId14"/>
-    <p:sldId id="261" r:id="rId15"/>
+    <p:sldId id="261" r:id="rId14"/>
   </p:sldIdLst>
   <p:sldSz cx="12192000" cy="6858000"/>
   <p:notesSz cx="6858000" cy="9144000"/>
   <p:embeddedFontLst>
     <p:embeddedFont>
-      <p:font typeface="Georgia" panose="02040502050405020303" pitchFamily="18" charset="0"/>
-      <p:regular r:id="rId16"/>
-      <p:bold r:id="rId17"/>
-      <p:italic r:id="rId18"/>
-      <p:boldItalic r:id="rId19"/>
+      <p:font typeface="Verdana" panose="020B0604030504040204" pitchFamily="34" charset="0"/>
+      <p:regular r:id="rId15"/>
+      <p:bold r:id="rId16"/>
+      <p:italic r:id="rId17"/>
+      <p:boldItalic r:id="rId18"/>
     </p:embeddedFont>
     <p:embeddedFont>
-      <p:font typeface="함초롬바탕" panose="02030604000101010101" pitchFamily="18" charset="-127"/>
-      <p:regular r:id="rId20"/>
-      <p:bold r:id="rId21"/>
+      <p:font typeface="함초롬바탕" panose="02030504000101010101" pitchFamily="18" charset="-127"/>
+      <p:regular r:id="rId19"/>
+      <p:bold r:id="rId20"/>
+    </p:embeddedFont>
+    <p:embeddedFont>
+      <p:font typeface="Georgia" panose="02040502050405020303" pitchFamily="18" charset="0"/>
+      <p:regular r:id="rId21"/>
+      <p:bold r:id="rId22"/>
+      <p:italic r:id="rId23"/>
+      <p:boldItalic r:id="rId24"/>
+    </p:embeddedFont>
+    <p:embeddedFont>
+      <p:font typeface="HY견명조" panose="02030600000101010101" pitchFamily="18" charset="-127"/>
+      <p:regular r:id="rId25"/>
     </p:embeddedFont>
     <p:embeddedFont>
       <p:font typeface="맑은 고딕" panose="020B0503020000020004" pitchFamily="50" charset="-127"/>
-      <p:regular r:id="rId22"/>
-      <p:bold r:id="rId23"/>
-    </p:embeddedFont>
-    <p:embeddedFont>
-      <p:font typeface="Verdana" panose="020B0604030504040204" pitchFamily="34" charset="0"/>
-      <p:regular r:id="rId24"/>
-      <p:bold r:id="rId25"/>
-      <p:italic r:id="rId26"/>
-      <p:boldItalic r:id="rId27"/>
-    </p:embeddedFont>
-    <p:embeddedFont>
-      <p:font typeface="HY견명조" panose="02030600000101010101" pitchFamily="18" charset="-127"/>
-      <p:regular r:id="rId28"/>
+      <p:regular r:id="rId26"/>
+      <p:bold r:id="rId27"/>
     </p:embeddedFont>
   </p:embeddedFontLst>
   <p:defaultTextStyle>
@@ -149,7 +148,7 @@
   </p:defaultTextStyle>
   <p:extLst>
     <p:ext uri="{EFAFB233-063F-42B5-8137-9DF3F51BA10A}">
-      <p15:sldGuideLst xmlns:p15="http://schemas.microsoft.com/office/powerpoint/2012/main">
+      <p15:sldGuideLst xmlns:p15="http://schemas.microsoft.com/office/powerpoint/2012/main" xmlns="">
         <p15:guide id="1" orient="horz" pos="2160">
           <p15:clr>
             <a:srgbClr val="A4A3A4"/>
@@ -3621,14 +3620,14 @@
                 <a:gridCol w="4392487">
                   <a:extLst>
                     <a:ext uri="{9D8B030D-6E8A-4147-A177-3AD203B41FA5}">
-                      <a16:colId xmlns:a16="http://schemas.microsoft.com/office/drawing/2014/main" val="20000"/>
+                      <a16:colId xmlns:a16="http://schemas.microsoft.com/office/drawing/2014/main" xmlns="" val="20000"/>
                     </a:ext>
                   </a:extLst>
                 </a:gridCol>
                 <a:gridCol w="4392488">
                   <a:extLst>
                     <a:ext uri="{9D8B030D-6E8A-4147-A177-3AD203B41FA5}">
-                      <a16:colId xmlns:a16="http://schemas.microsoft.com/office/drawing/2014/main" val="20001"/>
+                      <a16:colId xmlns:a16="http://schemas.microsoft.com/office/drawing/2014/main" xmlns="" val="20001"/>
                     </a:ext>
                   </a:extLst>
                 </a:gridCol>
@@ -3674,7 +3673,7 @@
                 </a:tc>
                 <a:extLst>
                   <a:ext uri="{0D108BD9-81ED-4DB2-BD59-A6C34878D82A}">
-                    <a16:rowId xmlns:a16="http://schemas.microsoft.com/office/drawing/2014/main" val="10000"/>
+                    <a16:rowId xmlns:a16="http://schemas.microsoft.com/office/drawing/2014/main" xmlns="" val="10000"/>
                   </a:ext>
                 </a:extLst>
               </a:tr>
@@ -3722,7 +3721,7 @@
                 </a:tc>
                 <a:extLst>
                   <a:ext uri="{0D108BD9-81ED-4DB2-BD59-A6C34878D82A}">
-                    <a16:rowId xmlns:a16="http://schemas.microsoft.com/office/drawing/2014/main" val="10001"/>
+                    <a16:rowId xmlns:a16="http://schemas.microsoft.com/office/drawing/2014/main" xmlns="" val="10001"/>
                   </a:ext>
                 </a:extLst>
               </a:tr>
@@ -3770,7 +3769,7 @@
                 </a:tc>
                 <a:extLst>
                   <a:ext uri="{0D108BD9-81ED-4DB2-BD59-A6C34878D82A}">
-                    <a16:rowId xmlns:a16="http://schemas.microsoft.com/office/drawing/2014/main" val="10002"/>
+                    <a16:rowId xmlns:a16="http://schemas.microsoft.com/office/drawing/2014/main" xmlns="" val="10002"/>
                   </a:ext>
                 </a:extLst>
               </a:tr>
@@ -3818,7 +3817,7 @@
                 </a:tc>
                 <a:extLst>
                   <a:ext uri="{0D108BD9-81ED-4DB2-BD59-A6C34878D82A}">
-                    <a16:rowId xmlns:a16="http://schemas.microsoft.com/office/drawing/2014/main" val="10003"/>
+                    <a16:rowId xmlns:a16="http://schemas.microsoft.com/office/drawing/2014/main" xmlns="" val="10003"/>
                   </a:ext>
                 </a:extLst>
               </a:tr>
@@ -3866,7 +3865,7 @@
                 </a:tc>
                 <a:extLst>
                   <a:ext uri="{0D108BD9-81ED-4DB2-BD59-A6C34878D82A}">
-                    <a16:rowId xmlns:a16="http://schemas.microsoft.com/office/drawing/2014/main" val="10004"/>
+                    <a16:rowId xmlns:a16="http://schemas.microsoft.com/office/drawing/2014/main" xmlns="" val="10004"/>
                   </a:ext>
                 </a:extLst>
               </a:tr>
@@ -3946,7 +3945,7 @@
                 </a:tc>
                 <a:extLst>
                   <a:ext uri="{0D108BD9-81ED-4DB2-BD59-A6C34878D82A}">
-                    <a16:rowId xmlns:a16="http://schemas.microsoft.com/office/drawing/2014/main" val="10005"/>
+                    <a16:rowId xmlns:a16="http://schemas.microsoft.com/office/drawing/2014/main" xmlns="" val="10005"/>
                   </a:ext>
                 </a:extLst>
               </a:tr>
@@ -4047,7 +4046,7 @@
                 </a:tc>
                 <a:extLst>
                   <a:ext uri="{0D108BD9-81ED-4DB2-BD59-A6C34878D82A}">
-                    <a16:rowId xmlns:a16="http://schemas.microsoft.com/office/drawing/2014/main" val="649880054"/>
+                    <a16:rowId xmlns:a16="http://schemas.microsoft.com/office/drawing/2014/main" xmlns="" val="649880054"/>
                   </a:ext>
                 </a:extLst>
               </a:tr>
@@ -4140,7 +4139,7 @@
                 </a:tc>
                 <a:extLst>
                   <a:ext uri="{0D108BD9-81ED-4DB2-BD59-A6C34878D82A}">
-                    <a16:rowId xmlns:a16="http://schemas.microsoft.com/office/drawing/2014/main" val="3725645798"/>
+                    <a16:rowId xmlns:a16="http://schemas.microsoft.com/office/drawing/2014/main" xmlns="" val="3725645798"/>
                   </a:ext>
                 </a:extLst>
               </a:tr>
@@ -4233,7 +4232,7 @@
                 </a:tc>
                 <a:extLst>
                   <a:ext uri="{0D108BD9-81ED-4DB2-BD59-A6C34878D82A}">
-                    <a16:rowId xmlns:a16="http://schemas.microsoft.com/office/drawing/2014/main" val="868057080"/>
+                    <a16:rowId xmlns:a16="http://schemas.microsoft.com/office/drawing/2014/main" xmlns="" val="868057080"/>
                   </a:ext>
                 </a:extLst>
               </a:tr>
@@ -5234,7 +5233,7 @@
             <a:pPr algn="ctr"/>
             <a:r>
               <a:rPr lang="ko-KR" altLang="en-US" dirty="0" smtClean="0"/>
-              <a:t>개발 일정</a:t>
+              <a:t>역할 분담</a:t>
             </a:r>
             <a:endParaRPr lang="ko-KR" altLang="en-US" dirty="0"/>
           </a:p>
@@ -5379,2077 +5378,14 @@
       </p:grpSp>
       <p:graphicFrame>
         <p:nvGraphicFramePr>
-          <p:cNvPr id="20" name="표 19"/>
+          <p:cNvPr id="18" name="표 17"/>
           <p:cNvGraphicFramePr>
             <a:graphicFrameLocks noGrp="1"/>
           </p:cNvGraphicFramePr>
           <p:nvPr>
             <p:extLst>
               <p:ext uri="{D42A27DB-BD31-4B8C-83A1-F6EECF244321}">
-                <p14:modId xmlns:p14="http://schemas.microsoft.com/office/powerpoint/2010/main" val="830856589"/>
-              </p:ext>
-            </p:extLst>
-          </p:nvPr>
-        </p:nvGraphicFramePr>
-        <p:xfrm>
-          <a:off x="3133583" y="1528680"/>
-          <a:ext cx="8262300" cy="4909836"/>
-        </p:xfrm>
-        <a:graphic>
-          <a:graphicData uri="http://schemas.openxmlformats.org/drawingml/2006/table">
-            <a:tbl>
-              <a:tblPr firstRow="1" bandRow="1">
-                <a:tableStyleId>{F5AB1C69-6EDB-4FF4-983F-18BD219EF322}</a:tableStyleId>
-              </a:tblPr>
-              <a:tblGrid>
-                <a:gridCol w="1213800">
-                  <a:extLst>
-                    <a:ext uri="{9D8B030D-6E8A-4147-A177-3AD203B41FA5}">
-                      <a16:colId xmlns:a16="http://schemas.microsoft.com/office/drawing/2014/main" val="20000"/>
-                    </a:ext>
-                  </a:extLst>
-                </a:gridCol>
-                <a:gridCol w="7048500">
-                  <a:extLst>
-                    <a:ext uri="{9D8B030D-6E8A-4147-A177-3AD203B41FA5}">
-                      <a16:colId xmlns:a16="http://schemas.microsoft.com/office/drawing/2014/main" val="20001"/>
-                    </a:ext>
-                  </a:extLst>
-                </a:gridCol>
-              </a:tblGrid>
-              <a:tr h="181248">
-                <a:tc>
-                  <a:txBody>
-                    <a:bodyPr/>
-                    <a:lstStyle/>
-                    <a:p>
-                      <a:pPr algn="ctr" latinLnBrk="1"/>
-                      <a:r>
-                        <a:rPr lang="ko-KR" altLang="en-US" dirty="0" smtClean="0"/>
-                        <a:t>주차</a:t>
-                      </a:r>
-                      <a:endParaRPr lang="ko-KR" altLang="en-US" dirty="0"/>
-                    </a:p>
-                  </a:txBody>
-                  <a:tcPr anchor="ctr"/>
-                </a:tc>
-                <a:tc>
-                  <a:txBody>
-                    <a:bodyPr/>
-                    <a:lstStyle/>
-                    <a:p>
-                      <a:pPr algn="ctr" latinLnBrk="1"/>
-                      <a:r>
-                        <a:rPr lang="ko-KR" altLang="en-US" dirty="0" smtClean="0"/>
-                        <a:t>내용</a:t>
-                      </a:r>
-                      <a:endParaRPr lang="ko-KR" altLang="en-US" dirty="0"/>
-                    </a:p>
-                  </a:txBody>
-                  <a:tcPr anchor="ctr"/>
-                </a:tc>
-                <a:extLst>
-                  <a:ext uri="{0D108BD9-81ED-4DB2-BD59-A6C34878D82A}">
-                    <a16:rowId xmlns:a16="http://schemas.microsoft.com/office/drawing/2014/main" val="10000"/>
-                  </a:ext>
-                </a:extLst>
-              </a:tr>
-              <a:tr h="0">
-                <a:tc>
-                  <a:txBody>
-                    <a:bodyPr/>
-                    <a:lstStyle/>
-                    <a:p>
-                      <a:pPr algn="ctr" latinLnBrk="1"/>
-                      <a:r>
-                        <a:rPr lang="en-US" altLang="ko-KR" sz="1600" dirty="0" smtClean="0">
-                          <a:latin typeface="+mn-ea"/>
-                          <a:ea typeface="+mn-ea"/>
-                        </a:rPr>
-                        <a:t>1</a:t>
-                      </a:r>
-                      <a:r>
-                        <a:rPr lang="ko-KR" altLang="en-US" sz="1600" dirty="0" smtClean="0">
-                          <a:latin typeface="+mn-ea"/>
-                          <a:ea typeface="+mn-ea"/>
-                        </a:rPr>
-                        <a:t>주차</a:t>
-                      </a:r>
-                      <a:endParaRPr lang="en-US" altLang="ko-KR" sz="1600" dirty="0" smtClean="0">
-                        <a:latin typeface="+mn-ea"/>
-                        <a:ea typeface="+mn-ea"/>
-                      </a:endParaRPr>
-                    </a:p>
-                    <a:p>
-                      <a:pPr algn="ctr" latinLnBrk="1"/>
-                      <a:r>
-                        <a:rPr lang="en-US" altLang="ko-KR" sz="1600" dirty="0" smtClean="0">
-                          <a:latin typeface="+mn-ea"/>
-                          <a:ea typeface="+mn-ea"/>
-                        </a:rPr>
-                        <a:t>~5/9</a:t>
-                      </a:r>
-                    </a:p>
-                  </a:txBody>
-                  <a:tcPr anchor="ctr"/>
-                </a:tc>
-                <a:tc>
-                  <a:txBody>
-                    <a:bodyPr/>
-                    <a:lstStyle/>
-                    <a:p>
-                      <a:pPr algn="l" latinLnBrk="1"/>
-                      <a:r>
-                        <a:rPr lang="en-US" altLang="ko-KR" sz="1600" dirty="0" smtClean="0">
-                          <a:latin typeface="+mn-ea"/>
-                          <a:ea typeface="+mn-ea"/>
-                        </a:rPr>
-                        <a:t>Open</a:t>
-                      </a:r>
-                      <a:r>
-                        <a:rPr lang="en-US" altLang="ko-KR" sz="1600" baseline="0" dirty="0" smtClean="0">
-                          <a:latin typeface="+mn-ea"/>
-                          <a:ea typeface="+mn-ea"/>
-                        </a:rPr>
-                        <a:t>API </a:t>
-                      </a:r>
-                      <a:r>
-                        <a:rPr lang="ko-KR" altLang="en-US" sz="1600" baseline="0" dirty="0" smtClean="0">
-                          <a:latin typeface="+mn-ea"/>
-                          <a:ea typeface="+mn-ea"/>
-                        </a:rPr>
-                        <a:t>조사 및 </a:t>
-                      </a:r>
-                      <a:r>
-                        <a:rPr lang="en-US" altLang="ko-KR" sz="1600" baseline="0" dirty="0" smtClean="0">
-                          <a:latin typeface="+mn-ea"/>
-                          <a:ea typeface="+mn-ea"/>
-                        </a:rPr>
-                        <a:t>PPT </a:t>
-                      </a:r>
-                      <a:r>
-                        <a:rPr lang="ko-KR" altLang="en-US" sz="1600" baseline="0" dirty="0" smtClean="0">
-                          <a:latin typeface="+mn-ea"/>
-                          <a:ea typeface="+mn-ea"/>
-                        </a:rPr>
-                        <a:t>자료 작성 및 업로드</a:t>
-                      </a:r>
-                      <a:endParaRPr lang="en-US" altLang="ko-KR" sz="1600" dirty="0" smtClean="0">
-                        <a:latin typeface="+mn-ea"/>
-                        <a:ea typeface="+mn-ea"/>
-                      </a:endParaRPr>
-                    </a:p>
-                  </a:txBody>
-                  <a:tcPr anchor="ctr"/>
-                </a:tc>
-                <a:extLst>
-                  <a:ext uri="{0D108BD9-81ED-4DB2-BD59-A6C34878D82A}">
-                    <a16:rowId xmlns:a16="http://schemas.microsoft.com/office/drawing/2014/main" val="10001"/>
-                  </a:ext>
-                </a:extLst>
-              </a:tr>
-              <a:tr h="0">
-                <a:tc>
-                  <a:txBody>
-                    <a:bodyPr/>
-                    <a:lstStyle/>
-                    <a:p>
-                      <a:pPr algn="ctr" latinLnBrk="1"/>
-                      <a:r>
-                        <a:rPr lang="en-US" altLang="ko-KR" sz="1600" dirty="0" smtClean="0">
-                          <a:latin typeface="+mn-ea"/>
-                          <a:ea typeface="+mn-ea"/>
-                        </a:rPr>
-                        <a:t>2</a:t>
-                      </a:r>
-                      <a:r>
-                        <a:rPr lang="ko-KR" altLang="en-US" sz="1600" dirty="0" smtClean="0">
-                          <a:latin typeface="+mn-ea"/>
-                          <a:ea typeface="+mn-ea"/>
-                        </a:rPr>
-                        <a:t>주차</a:t>
-                      </a:r>
-                      <a:endParaRPr lang="en-US" altLang="ko-KR" sz="1600" dirty="0" smtClean="0">
-                        <a:latin typeface="+mn-ea"/>
-                        <a:ea typeface="+mn-ea"/>
-                      </a:endParaRPr>
-                    </a:p>
-                    <a:p>
-                      <a:pPr algn="ctr" latinLnBrk="1"/>
-                      <a:r>
-                        <a:rPr lang="en-US" altLang="ko-KR" sz="1600" dirty="0" smtClean="0">
-                          <a:latin typeface="+mn-ea"/>
-                          <a:ea typeface="+mn-ea"/>
-                        </a:rPr>
-                        <a:t>~5/16</a:t>
-                      </a:r>
-                      <a:endParaRPr lang="ko-KR" altLang="en-US" sz="1600" dirty="0">
-                        <a:latin typeface="+mn-ea"/>
-                        <a:ea typeface="+mn-ea"/>
-                      </a:endParaRPr>
-                    </a:p>
-                  </a:txBody>
-                  <a:tcPr anchor="ctr"/>
-                </a:tc>
-                <a:tc>
-                  <a:txBody>
-                    <a:bodyPr/>
-                    <a:lstStyle/>
-                    <a:p>
-                      <a:pPr marL="0" marR="0" indent="0" algn="l" defTabSz="914400" rtl="0" eaLnBrk="1" fontAlgn="auto" latinLnBrk="1" hangingPunct="1">
-                        <a:lnSpc>
-                          <a:spcPct val="100000"/>
-                        </a:lnSpc>
-                        <a:spcBef>
-                          <a:spcPts val="0"/>
-                        </a:spcBef>
-                        <a:spcAft>
-                          <a:spcPts val="0"/>
-                        </a:spcAft>
-                        <a:buClrTx/>
-                        <a:buSzTx/>
-                        <a:buFontTx/>
-                        <a:buNone/>
-                        <a:tabLst/>
-                        <a:defRPr/>
-                      </a:pPr>
-                      <a:r>
-                        <a:rPr lang="ko-KR" altLang="en-US" sz="1600" dirty="0" smtClean="0">
-                          <a:latin typeface="+mn-ea"/>
-                          <a:ea typeface="+mn-ea"/>
-                        </a:rPr>
-                        <a:t>기획 발표 </a:t>
-                      </a:r>
-                      <a:r>
-                        <a:rPr lang="en-US" altLang="ko-KR" sz="1600" dirty="0" smtClean="0">
-                          <a:latin typeface="+mn-ea"/>
-                          <a:ea typeface="+mn-ea"/>
-                        </a:rPr>
-                        <a:t>5</a:t>
-                      </a:r>
-                      <a:r>
-                        <a:rPr lang="ko-KR" altLang="en-US" sz="1600" dirty="0" smtClean="0">
-                          <a:latin typeface="+mn-ea"/>
-                          <a:ea typeface="+mn-ea"/>
-                        </a:rPr>
-                        <a:t>월 </a:t>
-                      </a:r>
-                      <a:r>
-                        <a:rPr lang="en-US" altLang="ko-KR" sz="1600" dirty="0" smtClean="0">
-                          <a:latin typeface="+mn-ea"/>
-                          <a:ea typeface="+mn-ea"/>
-                        </a:rPr>
-                        <a:t>10</a:t>
-                      </a:r>
-                      <a:r>
-                        <a:rPr lang="ko-KR" altLang="en-US" sz="1600" dirty="0" smtClean="0">
-                          <a:latin typeface="+mn-ea"/>
-                          <a:ea typeface="+mn-ea"/>
-                        </a:rPr>
-                        <a:t>일</a:t>
-                      </a:r>
-                      <a:endParaRPr lang="en-US" altLang="ko-KR" sz="1600" baseline="0" dirty="0" smtClean="0">
-                        <a:latin typeface="+mn-ea"/>
-                        <a:ea typeface="+mn-ea"/>
-                      </a:endParaRPr>
-                    </a:p>
-                    <a:p>
-                      <a:pPr marL="0" marR="0" indent="0" algn="l" defTabSz="914400" rtl="0" eaLnBrk="1" fontAlgn="auto" latinLnBrk="1" hangingPunct="1">
-                        <a:lnSpc>
-                          <a:spcPct val="100000"/>
-                        </a:lnSpc>
-                        <a:spcBef>
-                          <a:spcPts val="0"/>
-                        </a:spcBef>
-                        <a:spcAft>
-                          <a:spcPts val="0"/>
-                        </a:spcAft>
-                        <a:buClrTx/>
-                        <a:buSzTx/>
-                        <a:buFontTx/>
-                        <a:buNone/>
-                        <a:tabLst/>
-                        <a:defRPr/>
-                      </a:pPr>
-                      <a:r>
-                        <a:rPr lang="en-US" altLang="ko-KR" sz="1600" baseline="0" dirty="0" smtClean="0">
-                          <a:latin typeface="+mn-ea"/>
-                          <a:ea typeface="+mn-ea"/>
-                        </a:rPr>
-                        <a:t>API</a:t>
-                      </a:r>
-                      <a:r>
-                        <a:rPr lang="ko-KR" altLang="en-US" sz="1600" baseline="0" dirty="0" smtClean="0">
-                          <a:latin typeface="+mn-ea"/>
-                          <a:ea typeface="+mn-ea"/>
-                        </a:rPr>
-                        <a:t>사용법 숙지</a:t>
-                      </a:r>
-                      <a:r>
-                        <a:rPr lang="en-US" altLang="ko-KR" sz="1600" baseline="0" dirty="0" smtClean="0">
-                          <a:latin typeface="+mn-ea"/>
-                          <a:ea typeface="+mn-ea"/>
-                        </a:rPr>
-                        <a:t>, </a:t>
-                      </a:r>
-                      <a:r>
-                        <a:rPr lang="en-US" altLang="ko-KR" sz="1600" dirty="0" smtClean="0">
-                          <a:latin typeface="+mn-ea"/>
-                          <a:ea typeface="+mn-ea"/>
-                        </a:rPr>
-                        <a:t>GUI</a:t>
-                      </a:r>
-                      <a:r>
-                        <a:rPr lang="en-US" altLang="ko-KR" sz="1600" baseline="0" dirty="0" smtClean="0">
-                          <a:latin typeface="+mn-ea"/>
-                          <a:ea typeface="+mn-ea"/>
-                        </a:rPr>
-                        <a:t> </a:t>
-                      </a:r>
-                      <a:r>
-                        <a:rPr lang="ko-KR" altLang="en-US" sz="1600" baseline="0" dirty="0" err="1" smtClean="0">
-                          <a:latin typeface="+mn-ea"/>
-                          <a:ea typeface="+mn-ea"/>
-                        </a:rPr>
-                        <a:t>파이썬</a:t>
-                      </a:r>
-                      <a:r>
-                        <a:rPr lang="ko-KR" altLang="en-US" sz="1600" baseline="0" dirty="0" smtClean="0">
-                          <a:latin typeface="+mn-ea"/>
-                          <a:ea typeface="+mn-ea"/>
-                        </a:rPr>
-                        <a:t> 연동 작업</a:t>
-                      </a:r>
-                      <a:endParaRPr lang="en-US" altLang="ko-KR" sz="1600" dirty="0" smtClean="0">
-                        <a:latin typeface="+mn-ea"/>
-                        <a:ea typeface="+mn-ea"/>
-                      </a:endParaRPr>
-                    </a:p>
-                  </a:txBody>
-                  <a:tcPr anchor="ctr"/>
-                </a:tc>
-                <a:extLst>
-                  <a:ext uri="{0D108BD9-81ED-4DB2-BD59-A6C34878D82A}">
-                    <a16:rowId xmlns:a16="http://schemas.microsoft.com/office/drawing/2014/main" val="10002"/>
-                  </a:ext>
-                </a:extLst>
-              </a:tr>
-              <a:tr h="0">
-                <a:tc>
-                  <a:txBody>
-                    <a:bodyPr/>
-                    <a:lstStyle/>
-                    <a:p>
-                      <a:pPr algn="ctr" latinLnBrk="1"/>
-                      <a:r>
-                        <a:rPr lang="en-US" altLang="ko-KR" sz="1600" dirty="0" smtClean="0">
-                          <a:latin typeface="+mn-ea"/>
-                          <a:ea typeface="+mn-ea"/>
-                        </a:rPr>
-                        <a:t>3</a:t>
-                      </a:r>
-                      <a:r>
-                        <a:rPr lang="ko-KR" altLang="en-US" sz="1600" dirty="0" smtClean="0">
-                          <a:latin typeface="+mn-ea"/>
-                          <a:ea typeface="+mn-ea"/>
-                        </a:rPr>
-                        <a:t>주차</a:t>
-                      </a:r>
-                      <a:endParaRPr lang="en-US" altLang="ko-KR" sz="1600" dirty="0" smtClean="0">
-                        <a:latin typeface="+mn-ea"/>
-                        <a:ea typeface="+mn-ea"/>
-                      </a:endParaRPr>
-                    </a:p>
-                    <a:p>
-                      <a:pPr algn="ctr" latinLnBrk="1"/>
-                      <a:r>
-                        <a:rPr lang="en-US" altLang="ko-KR" sz="1600" dirty="0" smtClean="0">
-                          <a:latin typeface="+mn-ea"/>
-                          <a:ea typeface="+mn-ea"/>
-                        </a:rPr>
-                        <a:t>~5/23</a:t>
-                      </a:r>
-                      <a:endParaRPr lang="ko-KR" altLang="en-US" sz="1600" dirty="0">
-                        <a:latin typeface="+mn-ea"/>
-                        <a:ea typeface="+mn-ea"/>
-                      </a:endParaRPr>
-                    </a:p>
-                  </a:txBody>
-                  <a:tcPr anchor="ctr"/>
-                </a:tc>
-                <a:tc>
-                  <a:txBody>
-                    <a:bodyPr/>
-                    <a:lstStyle/>
-                    <a:p>
-                      <a:pPr algn="l" latinLnBrk="1"/>
-                      <a:r>
-                        <a:rPr lang="ko-KR" altLang="en-US" sz="1600" baseline="0" dirty="0" smtClean="0">
-                          <a:latin typeface="+mn-ea"/>
-                          <a:ea typeface="+mn-ea"/>
-                        </a:rPr>
-                        <a:t>위치 정보 조회를 리스트로 구현</a:t>
-                      </a:r>
-                      <a:endParaRPr lang="en-US" altLang="ko-KR" sz="1600" baseline="0" dirty="0" smtClean="0">
-                        <a:latin typeface="+mn-ea"/>
-                        <a:ea typeface="+mn-ea"/>
-                      </a:endParaRPr>
-                    </a:p>
-                    <a:p>
-                      <a:pPr algn="l" latinLnBrk="1"/>
-                      <a:r>
-                        <a:rPr lang="ko-KR" altLang="en-US" sz="1600" baseline="0" dirty="0" smtClean="0">
-                          <a:latin typeface="+mn-ea"/>
-                          <a:ea typeface="+mn-ea"/>
-                        </a:rPr>
-                        <a:t>선택 지역 미세먼지 정보 실시간 페이지 구현</a:t>
-                      </a:r>
-                      <a:endParaRPr lang="en-US" altLang="ko-KR" sz="1600" baseline="0" dirty="0" smtClean="0">
-                        <a:latin typeface="+mn-ea"/>
-                        <a:ea typeface="+mn-ea"/>
-                      </a:endParaRPr>
-                    </a:p>
-                    <a:p>
-                      <a:pPr algn="l" latinLnBrk="1"/>
-                      <a:r>
-                        <a:rPr lang="ko-KR" altLang="en-US" sz="1600" baseline="0" dirty="0" smtClean="0">
-                          <a:latin typeface="+mn-ea"/>
-                          <a:ea typeface="+mn-ea"/>
-                        </a:rPr>
-                        <a:t>실시간 전국 예보 현황 페이지 구현</a:t>
-                      </a:r>
-                      <a:endParaRPr lang="en-US" altLang="ko-KR" sz="1600" baseline="0" dirty="0" smtClean="0">
-                        <a:latin typeface="+mn-ea"/>
-                        <a:ea typeface="+mn-ea"/>
-                      </a:endParaRPr>
-                    </a:p>
-                  </a:txBody>
-                  <a:tcPr anchor="ctr"/>
-                </a:tc>
-                <a:extLst>
-                  <a:ext uri="{0D108BD9-81ED-4DB2-BD59-A6C34878D82A}">
-                    <a16:rowId xmlns:a16="http://schemas.microsoft.com/office/drawing/2014/main" val="10003"/>
-                  </a:ext>
-                </a:extLst>
-              </a:tr>
-              <a:tr h="0">
-                <a:tc>
-                  <a:txBody>
-                    <a:bodyPr/>
-                    <a:lstStyle/>
-                    <a:p>
-                      <a:pPr algn="ctr" latinLnBrk="1"/>
-                      <a:r>
-                        <a:rPr lang="en-US" altLang="ko-KR" sz="1600" dirty="0" smtClean="0">
-                          <a:latin typeface="+mn-ea"/>
-                          <a:ea typeface="+mn-ea"/>
-                        </a:rPr>
-                        <a:t>4</a:t>
-                      </a:r>
-                      <a:r>
-                        <a:rPr lang="ko-KR" altLang="en-US" sz="1600" dirty="0" smtClean="0">
-                          <a:latin typeface="+mn-ea"/>
-                          <a:ea typeface="+mn-ea"/>
-                        </a:rPr>
-                        <a:t>주차</a:t>
-                      </a:r>
-                      <a:endParaRPr lang="en-US" altLang="ko-KR" sz="1600" dirty="0" smtClean="0">
-                        <a:latin typeface="+mn-ea"/>
-                        <a:ea typeface="+mn-ea"/>
-                      </a:endParaRPr>
-                    </a:p>
-                    <a:p>
-                      <a:pPr algn="ctr" latinLnBrk="1"/>
-                      <a:r>
-                        <a:rPr lang="en-US" altLang="ko-KR" sz="1600" dirty="0" smtClean="0">
-                          <a:latin typeface="+mn-ea"/>
-                          <a:ea typeface="+mn-ea"/>
-                        </a:rPr>
-                        <a:t>~5/31</a:t>
-                      </a:r>
-                      <a:endParaRPr lang="ko-KR" altLang="en-US" sz="1600" dirty="0">
-                        <a:latin typeface="+mn-ea"/>
-                        <a:ea typeface="+mn-ea"/>
-                      </a:endParaRPr>
-                    </a:p>
-                  </a:txBody>
-                  <a:tcPr anchor="ctr"/>
-                </a:tc>
-                <a:tc>
-                  <a:txBody>
-                    <a:bodyPr/>
-                    <a:lstStyle/>
-                    <a:p>
-                      <a:pPr algn="l" latinLnBrk="1"/>
-                      <a:r>
-                        <a:rPr lang="ko-KR" altLang="en-US" sz="1600" b="0" dirty="0" smtClean="0">
-                          <a:latin typeface="+mn-ea"/>
-                          <a:ea typeface="+mn-ea"/>
-                        </a:rPr>
-                        <a:t>미세</a:t>
-                      </a:r>
-                      <a:r>
-                        <a:rPr lang="ko-KR" altLang="en-US" sz="1600" b="0" baseline="0" dirty="0" smtClean="0">
-                          <a:latin typeface="+mn-ea"/>
-                          <a:ea typeface="+mn-ea"/>
-                        </a:rPr>
-                        <a:t> 먼지 농도 정보 페이지 구현</a:t>
-                      </a:r>
-                      <a:endParaRPr lang="en-US" altLang="ko-KR" sz="1600" b="0" dirty="0" smtClean="0">
-                        <a:latin typeface="+mn-ea"/>
-                        <a:ea typeface="+mn-ea"/>
-                      </a:endParaRPr>
-                    </a:p>
-                    <a:p>
-                      <a:pPr algn="l" latinLnBrk="1"/>
-                      <a:r>
-                        <a:rPr lang="ko-KR" altLang="en-US" sz="1600" b="0" dirty="0" smtClean="0">
-                          <a:latin typeface="+mn-ea"/>
-                          <a:ea typeface="+mn-ea"/>
-                        </a:rPr>
-                        <a:t>원하는 정보 항목을 선택하여 메일로 발송 할</a:t>
-                      </a:r>
-                      <a:r>
-                        <a:rPr lang="ko-KR" altLang="en-US" sz="1600" b="0" baseline="0" dirty="0" smtClean="0">
-                          <a:latin typeface="+mn-ea"/>
-                          <a:ea typeface="+mn-ea"/>
-                        </a:rPr>
-                        <a:t> 수 있게 페이지 구현</a:t>
-                      </a:r>
-                      <a:endParaRPr lang="en-US" altLang="ko-KR" sz="1600" b="0" dirty="0" smtClean="0">
-                        <a:latin typeface="+mn-ea"/>
-                        <a:ea typeface="+mn-ea"/>
-                      </a:endParaRPr>
-                    </a:p>
-                    <a:p>
-                      <a:pPr algn="l" latinLnBrk="1"/>
-                      <a:r>
-                        <a:rPr lang="ko-KR" altLang="en-US" sz="1600" b="0" dirty="0" smtClean="0">
-                          <a:latin typeface="+mn-ea"/>
-                          <a:ea typeface="+mn-ea"/>
-                        </a:rPr>
-                        <a:t>중간 시연 발표</a:t>
-                      </a:r>
-                      <a:r>
-                        <a:rPr lang="en-US" altLang="ko-KR" sz="1600" b="0" dirty="0" smtClean="0">
-                          <a:latin typeface="+mn-ea"/>
-                          <a:ea typeface="+mn-ea"/>
-                        </a:rPr>
-                        <a:t>(5</a:t>
-                      </a:r>
-                      <a:r>
-                        <a:rPr lang="ko-KR" altLang="en-US" sz="1600" b="0" dirty="0" smtClean="0">
-                          <a:latin typeface="+mn-ea"/>
-                          <a:ea typeface="+mn-ea"/>
-                        </a:rPr>
-                        <a:t>월 </a:t>
-                      </a:r>
-                      <a:r>
-                        <a:rPr lang="en-US" altLang="ko-KR" sz="1600" b="0" dirty="0" smtClean="0">
-                          <a:latin typeface="+mn-ea"/>
-                          <a:ea typeface="+mn-ea"/>
-                        </a:rPr>
-                        <a:t>31</a:t>
-                      </a:r>
-                      <a:r>
-                        <a:rPr lang="ko-KR" altLang="en-US" sz="1600" b="0" dirty="0" smtClean="0">
-                          <a:latin typeface="+mn-ea"/>
-                          <a:ea typeface="+mn-ea"/>
-                        </a:rPr>
-                        <a:t>일</a:t>
-                      </a:r>
-                      <a:r>
-                        <a:rPr lang="en-US" altLang="ko-KR" sz="1600" b="0" dirty="0" smtClean="0">
-                          <a:latin typeface="+mn-ea"/>
-                          <a:ea typeface="+mn-ea"/>
-                        </a:rPr>
-                        <a:t>)</a:t>
-                      </a:r>
-                      <a:r>
-                        <a:rPr lang="en-US" altLang="ko-KR" sz="1600" b="0" baseline="0" dirty="0" smtClean="0">
-                          <a:latin typeface="+mn-ea"/>
-                          <a:ea typeface="+mn-ea"/>
-                        </a:rPr>
-                        <a:t> </a:t>
-                      </a:r>
-                      <a:endParaRPr lang="ko-KR" altLang="en-US" sz="1600" b="0" dirty="0">
-                        <a:latin typeface="+mn-ea"/>
-                        <a:ea typeface="+mn-ea"/>
-                      </a:endParaRPr>
-                    </a:p>
-                  </a:txBody>
-                  <a:tcPr anchor="ctr"/>
-                </a:tc>
-                <a:extLst>
-                  <a:ext uri="{0D108BD9-81ED-4DB2-BD59-A6C34878D82A}">
-                    <a16:rowId xmlns:a16="http://schemas.microsoft.com/office/drawing/2014/main" val="10004"/>
-                  </a:ext>
-                </a:extLst>
-              </a:tr>
-              <a:tr h="0">
-                <a:tc>
-                  <a:txBody>
-                    <a:bodyPr/>
-                    <a:lstStyle/>
-                    <a:p>
-                      <a:pPr algn="ctr" latinLnBrk="1"/>
-                      <a:r>
-                        <a:rPr lang="en-US" altLang="ko-KR" sz="1600" dirty="0" smtClean="0">
-                          <a:latin typeface="+mn-ea"/>
-                          <a:ea typeface="+mn-ea"/>
-                        </a:rPr>
-                        <a:t>5</a:t>
-                      </a:r>
-                      <a:r>
-                        <a:rPr lang="ko-KR" altLang="en-US" sz="1600" dirty="0" smtClean="0">
-                          <a:latin typeface="+mn-ea"/>
-                          <a:ea typeface="+mn-ea"/>
-                        </a:rPr>
-                        <a:t>주차</a:t>
-                      </a:r>
-                      <a:endParaRPr lang="en-US" altLang="ko-KR" sz="1600" dirty="0" smtClean="0">
-                        <a:latin typeface="+mn-ea"/>
-                        <a:ea typeface="+mn-ea"/>
-                      </a:endParaRPr>
-                    </a:p>
-                    <a:p>
-                      <a:pPr algn="ctr" latinLnBrk="1"/>
-                      <a:r>
-                        <a:rPr lang="en-US" altLang="ko-KR" sz="1600" dirty="0" smtClean="0">
-                          <a:latin typeface="+mn-ea"/>
-                          <a:ea typeface="+mn-ea"/>
-                        </a:rPr>
-                        <a:t>~6/6</a:t>
-                      </a:r>
-                      <a:endParaRPr lang="ko-KR" altLang="en-US" sz="1600" dirty="0">
-                        <a:latin typeface="+mn-ea"/>
-                        <a:ea typeface="+mn-ea"/>
-                      </a:endParaRPr>
-                    </a:p>
-                  </a:txBody>
-                  <a:tcPr anchor="ctr"/>
-                </a:tc>
-                <a:tc>
-                  <a:txBody>
-                    <a:bodyPr/>
-                    <a:lstStyle/>
-                    <a:p>
-                      <a:pPr algn="l" latinLnBrk="1"/>
-                      <a:r>
-                        <a:rPr lang="en-US" altLang="ko-KR" sz="1600" dirty="0" smtClean="0">
-                          <a:latin typeface="+mn-ea"/>
-                          <a:ea typeface="+mn-ea"/>
-                        </a:rPr>
-                        <a:t>C/C++</a:t>
-                      </a:r>
-                      <a:r>
-                        <a:rPr lang="en-US" altLang="ko-KR" sz="1600" baseline="0" dirty="0" smtClean="0">
-                          <a:latin typeface="+mn-ea"/>
-                          <a:ea typeface="+mn-ea"/>
-                        </a:rPr>
-                        <a:t> </a:t>
-                      </a:r>
-                      <a:r>
-                        <a:rPr lang="ko-KR" altLang="en-US" sz="1600" baseline="0" dirty="0" smtClean="0">
-                          <a:latin typeface="+mn-ea"/>
-                          <a:ea typeface="+mn-ea"/>
-                        </a:rPr>
-                        <a:t>연동 작업</a:t>
-                      </a:r>
-                      <a:endParaRPr lang="ko-KR" altLang="en-US" sz="1600" dirty="0">
-                        <a:latin typeface="+mn-ea"/>
-                        <a:ea typeface="+mn-ea"/>
-                      </a:endParaRPr>
-                    </a:p>
-                  </a:txBody>
-                  <a:tcPr anchor="ctr"/>
-                </a:tc>
-                <a:extLst>
-                  <a:ext uri="{0D108BD9-81ED-4DB2-BD59-A6C34878D82A}">
-                    <a16:rowId xmlns:a16="http://schemas.microsoft.com/office/drawing/2014/main" val="10005"/>
-                  </a:ext>
-                </a:extLst>
-              </a:tr>
-              <a:tr h="580398">
-                <a:tc>
-                  <a:txBody>
-                    <a:bodyPr/>
-                    <a:lstStyle/>
-                    <a:p>
-                      <a:pPr algn="ctr" latinLnBrk="1"/>
-                      <a:r>
-                        <a:rPr lang="en-US" altLang="ko-KR" sz="1600" dirty="0" smtClean="0">
-                          <a:latin typeface="+mn-ea"/>
-                          <a:ea typeface="+mn-ea"/>
-                        </a:rPr>
-                        <a:t>6</a:t>
-                      </a:r>
-                      <a:r>
-                        <a:rPr lang="ko-KR" altLang="en-US" sz="1600" dirty="0" smtClean="0">
-                          <a:latin typeface="+mn-ea"/>
-                          <a:ea typeface="+mn-ea"/>
-                        </a:rPr>
-                        <a:t>주차</a:t>
-                      </a:r>
-                      <a:endParaRPr lang="en-US" altLang="ko-KR" sz="1600" dirty="0" smtClean="0">
-                        <a:latin typeface="+mn-ea"/>
-                        <a:ea typeface="+mn-ea"/>
-                      </a:endParaRPr>
-                    </a:p>
-                    <a:p>
-                      <a:pPr algn="ctr" latinLnBrk="1"/>
-                      <a:r>
-                        <a:rPr lang="en-US" altLang="ko-KR" sz="1600" dirty="0" smtClean="0">
-                          <a:latin typeface="+mn-ea"/>
-                          <a:ea typeface="+mn-ea"/>
-                        </a:rPr>
-                        <a:t>~6/13</a:t>
-                      </a:r>
-                      <a:endParaRPr lang="ko-KR" altLang="en-US" sz="1600" dirty="0">
-                        <a:latin typeface="+mn-ea"/>
-                        <a:ea typeface="+mn-ea"/>
-                      </a:endParaRPr>
-                    </a:p>
-                  </a:txBody>
-                  <a:tcPr anchor="ctr"/>
-                </a:tc>
-                <a:tc>
-                  <a:txBody>
-                    <a:bodyPr/>
-                    <a:lstStyle/>
-                    <a:p>
-                      <a:pPr algn="l" latinLnBrk="1"/>
-                      <a:r>
-                        <a:rPr lang="en-US" altLang="ko-KR" sz="1600" dirty="0" err="1" smtClean="0">
-                          <a:latin typeface="+mn-ea"/>
-                          <a:ea typeface="+mn-ea"/>
-                        </a:rPr>
-                        <a:t>distutils</a:t>
-                      </a:r>
-                      <a:r>
-                        <a:rPr lang="en-US" altLang="ko-KR" sz="1600" dirty="0" smtClean="0">
-                          <a:latin typeface="+mn-ea"/>
-                          <a:ea typeface="+mn-ea"/>
-                        </a:rPr>
-                        <a:t> </a:t>
-                      </a:r>
-                      <a:r>
-                        <a:rPr lang="ko-KR" altLang="en-US" sz="1600" dirty="0" smtClean="0">
-                          <a:latin typeface="+mn-ea"/>
-                          <a:ea typeface="+mn-ea"/>
-                        </a:rPr>
-                        <a:t>모듈을 활용한 개발 패키지 배포 파일 작성 및 </a:t>
-                      </a:r>
-                      <a:r>
-                        <a:rPr lang="en-US" altLang="ko-KR" sz="1600" dirty="0" smtClean="0">
-                          <a:latin typeface="+mn-ea"/>
-                          <a:ea typeface="+mn-ea"/>
-                        </a:rPr>
-                        <a:t>GitHub </a:t>
-                      </a:r>
-                      <a:r>
-                        <a:rPr lang="ko-KR" altLang="en-US" sz="1600" dirty="0" smtClean="0">
-                          <a:latin typeface="+mn-ea"/>
-                          <a:ea typeface="+mn-ea"/>
-                        </a:rPr>
-                        <a:t>업로드</a:t>
-                      </a:r>
-                      <a:endParaRPr lang="ko-KR" altLang="en-US" sz="1600" dirty="0">
-                        <a:latin typeface="+mn-ea"/>
-                        <a:ea typeface="+mn-ea"/>
-                      </a:endParaRPr>
-                    </a:p>
-                  </a:txBody>
-                  <a:tcPr anchor="ctr"/>
-                </a:tc>
-                <a:extLst>
-                  <a:ext uri="{0D108BD9-81ED-4DB2-BD59-A6C34878D82A}">
-                    <a16:rowId xmlns:a16="http://schemas.microsoft.com/office/drawing/2014/main" val="10006"/>
-                  </a:ext>
-                </a:extLst>
-              </a:tr>
-              <a:tr h="580398">
-                <a:tc>
-                  <a:txBody>
-                    <a:bodyPr/>
-                    <a:lstStyle/>
-                    <a:p>
-                      <a:pPr algn="ctr" latinLnBrk="1"/>
-                      <a:r>
-                        <a:rPr lang="en-US" altLang="ko-KR" sz="1600" dirty="0" smtClean="0">
-                          <a:latin typeface="+mn-ea"/>
-                          <a:ea typeface="+mn-ea"/>
-                        </a:rPr>
-                        <a:t>7</a:t>
-                      </a:r>
-                      <a:r>
-                        <a:rPr lang="ko-KR" altLang="en-US" sz="1600" dirty="0" smtClean="0">
-                          <a:latin typeface="+mn-ea"/>
-                          <a:ea typeface="+mn-ea"/>
-                        </a:rPr>
-                        <a:t>주차</a:t>
-                      </a:r>
-                      <a:endParaRPr lang="en-US" altLang="ko-KR" sz="1600" dirty="0" smtClean="0">
-                        <a:latin typeface="+mn-ea"/>
-                        <a:ea typeface="+mn-ea"/>
-                      </a:endParaRPr>
-                    </a:p>
-                    <a:p>
-                      <a:pPr algn="ctr" latinLnBrk="1"/>
-                      <a:r>
-                        <a:rPr lang="en-US" altLang="ko-KR" sz="1600" dirty="0" smtClean="0">
-                          <a:latin typeface="+mn-ea"/>
-                          <a:ea typeface="+mn-ea"/>
-                        </a:rPr>
-                        <a:t>~6/16</a:t>
-                      </a:r>
-                      <a:endParaRPr lang="ko-KR" altLang="en-US" sz="1600" dirty="0">
-                        <a:latin typeface="+mn-ea"/>
-                        <a:ea typeface="+mn-ea"/>
-                      </a:endParaRPr>
-                    </a:p>
-                  </a:txBody>
-                  <a:tcPr anchor="ctr"/>
-                </a:tc>
-                <a:tc>
-                  <a:txBody>
-                    <a:bodyPr/>
-                    <a:lstStyle/>
-                    <a:p>
-                      <a:pPr algn="l" latinLnBrk="1"/>
-                      <a:r>
-                        <a:rPr lang="ko-KR" altLang="en-US" sz="1600" dirty="0" smtClean="0">
-                          <a:latin typeface="+mn-ea"/>
-                          <a:ea typeface="+mn-ea"/>
-                        </a:rPr>
-                        <a:t>버그 수정 및 최종 구현 발표 </a:t>
-                      </a:r>
-                      <a:r>
-                        <a:rPr lang="en-US" altLang="ko-KR" sz="1600" dirty="0" smtClean="0">
-                          <a:latin typeface="+mn-ea"/>
-                          <a:ea typeface="+mn-ea"/>
-                        </a:rPr>
-                        <a:t>(6</a:t>
-                      </a:r>
-                      <a:r>
-                        <a:rPr lang="ko-KR" altLang="en-US" sz="1600" dirty="0" smtClean="0">
-                          <a:latin typeface="+mn-ea"/>
-                          <a:ea typeface="+mn-ea"/>
-                        </a:rPr>
-                        <a:t>월 </a:t>
-                      </a:r>
-                      <a:r>
-                        <a:rPr lang="en-US" altLang="ko-KR" sz="1600" dirty="0" smtClean="0">
-                          <a:latin typeface="+mn-ea"/>
-                          <a:ea typeface="+mn-ea"/>
-                        </a:rPr>
-                        <a:t>16</a:t>
-                      </a:r>
-                      <a:r>
-                        <a:rPr lang="ko-KR" altLang="en-US" sz="1600" dirty="0" smtClean="0">
-                          <a:latin typeface="+mn-ea"/>
-                          <a:ea typeface="+mn-ea"/>
-                        </a:rPr>
-                        <a:t>일</a:t>
-                      </a:r>
-                      <a:r>
-                        <a:rPr lang="en-US" altLang="ko-KR" sz="1600" dirty="0" smtClean="0">
-                          <a:latin typeface="+mn-ea"/>
-                          <a:ea typeface="+mn-ea"/>
-                        </a:rPr>
-                        <a:t>)</a:t>
-                      </a:r>
-                      <a:endParaRPr lang="ko-KR" altLang="en-US" sz="1600" dirty="0">
-                        <a:latin typeface="+mn-ea"/>
-                        <a:ea typeface="+mn-ea"/>
-                      </a:endParaRPr>
-                    </a:p>
-                  </a:txBody>
-                  <a:tcPr anchor="ctr"/>
-                </a:tc>
-                <a:extLst>
-                  <a:ext uri="{0D108BD9-81ED-4DB2-BD59-A6C34878D82A}">
-                    <a16:rowId xmlns:a16="http://schemas.microsoft.com/office/drawing/2014/main" val="10007"/>
-                  </a:ext>
-                </a:extLst>
-              </a:tr>
-            </a:tbl>
-          </a:graphicData>
-        </a:graphic>
-      </p:graphicFrame>
-      <p:graphicFrame>
-        <p:nvGraphicFramePr>
-          <p:cNvPr id="19" name="표 18"/>
-          <p:cNvGraphicFramePr>
-            <a:graphicFrameLocks noGrp="1"/>
-          </p:cNvGraphicFramePr>
-          <p:nvPr>
-            <p:extLst>
-              <p:ext uri="{D42A27DB-BD31-4B8C-83A1-F6EECF244321}">
-                <p14:modId xmlns:p14="http://schemas.microsoft.com/office/powerpoint/2010/main" val="699225954"/>
-              </p:ext>
-            </p:extLst>
-          </p:nvPr>
-        </p:nvGraphicFramePr>
-        <p:xfrm>
-          <a:off x="3133583" y="1528680"/>
-          <a:ext cx="8262300" cy="4909840"/>
-        </p:xfrm>
-        <a:graphic>
-          <a:graphicData uri="http://schemas.openxmlformats.org/drawingml/2006/table">
-            <a:tbl>
-              <a:tblPr firstRow="1" bandRow="1">
-                <a:tableStyleId>{EB344D84-9AFB-497E-A393-DC336BA19D2E}</a:tableStyleId>
-              </a:tblPr>
-              <a:tblGrid>
-                <a:gridCol w="1213800">
-                  <a:extLst>
-                    <a:ext uri="{9D8B030D-6E8A-4147-A177-3AD203B41FA5}">
-                      <a16:colId xmlns:a16="http://schemas.microsoft.com/office/drawing/2014/main" val="20000"/>
-                    </a:ext>
-                  </a:extLst>
-                </a:gridCol>
-                <a:gridCol w="7048500">
-                  <a:extLst>
-                    <a:ext uri="{9D8B030D-6E8A-4147-A177-3AD203B41FA5}">
-                      <a16:colId xmlns:a16="http://schemas.microsoft.com/office/drawing/2014/main" val="20001"/>
-                    </a:ext>
-                  </a:extLst>
-                </a:gridCol>
-              </a:tblGrid>
-              <a:tr h="613730">
-                <a:tc>
-                  <a:txBody>
-                    <a:bodyPr/>
-                    <a:lstStyle/>
-                    <a:p>
-                      <a:pPr algn="ctr" latinLnBrk="1"/>
-                      <a:r>
-                        <a:rPr lang="ko-KR" altLang="en-US" dirty="0" smtClean="0"/>
-                        <a:t>주차</a:t>
-                      </a:r>
-                      <a:endParaRPr lang="ko-KR" altLang="en-US" dirty="0"/>
-                    </a:p>
-                  </a:txBody>
-                  <a:tcPr anchor="ctr"/>
-                </a:tc>
-                <a:tc>
-                  <a:txBody>
-                    <a:bodyPr/>
-                    <a:lstStyle/>
-                    <a:p>
-                      <a:pPr algn="ctr" latinLnBrk="1"/>
-                      <a:r>
-                        <a:rPr lang="ko-KR" altLang="en-US" dirty="0" smtClean="0"/>
-                        <a:t>내용</a:t>
-                      </a:r>
-                      <a:endParaRPr lang="ko-KR" altLang="en-US" dirty="0"/>
-                    </a:p>
-                  </a:txBody>
-                  <a:tcPr anchor="ctr"/>
-                </a:tc>
-                <a:extLst>
-                  <a:ext uri="{0D108BD9-81ED-4DB2-BD59-A6C34878D82A}">
-                    <a16:rowId xmlns:a16="http://schemas.microsoft.com/office/drawing/2014/main" val="10000"/>
-                  </a:ext>
-                </a:extLst>
-              </a:tr>
-              <a:tr h="613730">
-                <a:tc>
-                  <a:txBody>
-                    <a:bodyPr/>
-                    <a:lstStyle/>
-                    <a:p>
-                      <a:pPr algn="ctr" latinLnBrk="1"/>
-                      <a:r>
-                        <a:rPr lang="en-US" altLang="ko-KR" sz="1600" dirty="0" smtClean="0"/>
-                        <a:t>1</a:t>
-                      </a:r>
-                      <a:r>
-                        <a:rPr lang="ko-KR" altLang="en-US" sz="1600" dirty="0" smtClean="0"/>
-                        <a:t>주차</a:t>
-                      </a:r>
-                      <a:endParaRPr lang="en-US" altLang="ko-KR" sz="1600" dirty="0" smtClean="0"/>
-                    </a:p>
-                    <a:p>
-                      <a:pPr algn="ctr" latinLnBrk="1"/>
-                      <a:r>
-                        <a:rPr lang="en-US" altLang="ko-KR" sz="1600" dirty="0" smtClean="0"/>
-                        <a:t>~5/9</a:t>
-                      </a:r>
-                      <a:endParaRPr lang="en-US" altLang="ko-KR" sz="1600" dirty="0" smtClean="0">
-                        <a:latin typeface="+mn-ea"/>
-                        <a:ea typeface="+mn-ea"/>
-                      </a:endParaRPr>
-                    </a:p>
-                  </a:txBody>
-                  <a:tcPr anchor="ctr"/>
-                </a:tc>
-                <a:tc>
-                  <a:txBody>
-                    <a:bodyPr/>
-                    <a:lstStyle/>
-                    <a:p>
-                      <a:pPr algn="l" latinLnBrk="1"/>
-                      <a:r>
-                        <a:rPr lang="en-US" altLang="ko-KR" sz="1600" dirty="0" smtClean="0"/>
-                        <a:t>Open</a:t>
-                      </a:r>
-                      <a:r>
-                        <a:rPr lang="en-US" altLang="ko-KR" sz="1600" baseline="0" dirty="0" smtClean="0"/>
-                        <a:t>API </a:t>
-                      </a:r>
-                      <a:r>
-                        <a:rPr lang="ko-KR" altLang="en-US" sz="1600" baseline="0" dirty="0" smtClean="0"/>
-                        <a:t>조사 및 </a:t>
-                      </a:r>
-                      <a:r>
-                        <a:rPr lang="en-US" altLang="ko-KR" sz="1600" baseline="0" dirty="0" smtClean="0"/>
-                        <a:t>PPT </a:t>
-                      </a:r>
-                      <a:r>
-                        <a:rPr lang="ko-KR" altLang="en-US" sz="1600" baseline="0" dirty="0" smtClean="0"/>
-                        <a:t>자료 작성 및 업로드</a:t>
-                      </a:r>
-                      <a:endParaRPr lang="en-US" altLang="ko-KR" sz="1600" dirty="0" smtClean="0">
-                        <a:latin typeface="+mn-ea"/>
-                        <a:ea typeface="+mn-ea"/>
-                      </a:endParaRPr>
-                    </a:p>
-                  </a:txBody>
-                  <a:tcPr anchor="ctr"/>
-                </a:tc>
-                <a:extLst>
-                  <a:ext uri="{0D108BD9-81ED-4DB2-BD59-A6C34878D82A}">
-                    <a16:rowId xmlns:a16="http://schemas.microsoft.com/office/drawing/2014/main" val="10001"/>
-                  </a:ext>
-                </a:extLst>
-              </a:tr>
-              <a:tr h="613730">
-                <a:tc>
-                  <a:txBody>
-                    <a:bodyPr/>
-                    <a:lstStyle/>
-                    <a:p>
-                      <a:pPr algn="ctr" latinLnBrk="1"/>
-                      <a:r>
-                        <a:rPr lang="en-US" altLang="ko-KR" sz="1600" dirty="0" smtClean="0"/>
-                        <a:t>2</a:t>
-                      </a:r>
-                      <a:r>
-                        <a:rPr lang="ko-KR" altLang="en-US" sz="1600" dirty="0" smtClean="0"/>
-                        <a:t>주차</a:t>
-                      </a:r>
-                      <a:endParaRPr lang="en-US" altLang="ko-KR" sz="1600" dirty="0" smtClean="0"/>
-                    </a:p>
-                    <a:p>
-                      <a:pPr algn="ctr" latinLnBrk="1"/>
-                      <a:r>
-                        <a:rPr lang="en-US" altLang="ko-KR" sz="1600" dirty="0" smtClean="0"/>
-                        <a:t>~5/16</a:t>
-                      </a:r>
-                      <a:endParaRPr lang="ko-KR" altLang="en-US" sz="1600" dirty="0">
-                        <a:latin typeface="+mn-ea"/>
-                        <a:ea typeface="+mn-ea"/>
-                      </a:endParaRPr>
-                    </a:p>
-                  </a:txBody>
-                  <a:tcPr anchor="ctr"/>
-                </a:tc>
-                <a:tc>
-                  <a:txBody>
-                    <a:bodyPr/>
-                    <a:lstStyle/>
-                    <a:p>
-                      <a:pPr algn="l" latinLnBrk="1"/>
-                      <a:r>
-                        <a:rPr lang="ko-KR" altLang="en-US" sz="1600" dirty="0" smtClean="0"/>
-                        <a:t>기획 발표 </a:t>
-                      </a:r>
-                      <a:r>
-                        <a:rPr lang="en-US" altLang="ko-KR" sz="1600" dirty="0" smtClean="0"/>
-                        <a:t>5</a:t>
-                      </a:r>
-                      <a:r>
-                        <a:rPr lang="ko-KR" altLang="en-US" sz="1600" dirty="0" smtClean="0"/>
-                        <a:t>월 </a:t>
-                      </a:r>
-                      <a:r>
-                        <a:rPr lang="en-US" altLang="ko-KR" sz="1600" dirty="0" smtClean="0"/>
-                        <a:t>10</a:t>
-                      </a:r>
-                      <a:r>
-                        <a:rPr lang="ko-KR" altLang="en-US" sz="1600" dirty="0" smtClean="0"/>
-                        <a:t>일</a:t>
-                      </a:r>
-                      <a:r>
-                        <a:rPr lang="en-US" altLang="ko-KR" sz="1600" dirty="0" smtClean="0"/>
-                        <a:t>,</a:t>
-                      </a:r>
-                      <a:r>
-                        <a:rPr lang="en-US" altLang="ko-KR" sz="1600" baseline="0" dirty="0" smtClean="0"/>
-                        <a:t> API</a:t>
-                      </a:r>
-                      <a:r>
-                        <a:rPr lang="ko-KR" altLang="en-US" sz="1600" baseline="0" dirty="0" smtClean="0"/>
-                        <a:t>사용법 숙지</a:t>
-                      </a:r>
-                      <a:endParaRPr lang="ko-KR" altLang="en-US" sz="1600" dirty="0">
-                        <a:latin typeface="+mn-ea"/>
-                        <a:ea typeface="+mn-ea"/>
-                      </a:endParaRPr>
-                    </a:p>
-                  </a:txBody>
-                  <a:tcPr anchor="ctr"/>
-                </a:tc>
-                <a:extLst>
-                  <a:ext uri="{0D108BD9-81ED-4DB2-BD59-A6C34878D82A}">
-                    <a16:rowId xmlns:a16="http://schemas.microsoft.com/office/drawing/2014/main" val="10002"/>
-                  </a:ext>
-                </a:extLst>
-              </a:tr>
-              <a:tr h="613730">
-                <a:tc>
-                  <a:txBody>
-                    <a:bodyPr/>
-                    <a:lstStyle/>
-                    <a:p>
-                      <a:pPr algn="ctr" latinLnBrk="1"/>
-                      <a:r>
-                        <a:rPr lang="en-US" altLang="ko-KR" sz="1600" dirty="0" smtClean="0"/>
-                        <a:t>3</a:t>
-                      </a:r>
-                      <a:r>
-                        <a:rPr lang="ko-KR" altLang="en-US" sz="1600" dirty="0" smtClean="0"/>
-                        <a:t>주차</a:t>
-                      </a:r>
-                      <a:endParaRPr lang="en-US" altLang="ko-KR" sz="1600" dirty="0" smtClean="0"/>
-                    </a:p>
-                    <a:p>
-                      <a:pPr algn="ctr" latinLnBrk="1"/>
-                      <a:r>
-                        <a:rPr lang="en-US" altLang="ko-KR" sz="1600" dirty="0" smtClean="0"/>
-                        <a:t>~5/23</a:t>
-                      </a:r>
-                      <a:endParaRPr lang="ko-KR" altLang="en-US" sz="1600" dirty="0">
-                        <a:latin typeface="+mn-ea"/>
-                        <a:ea typeface="+mn-ea"/>
-                      </a:endParaRPr>
-                    </a:p>
-                  </a:txBody>
-                  <a:tcPr anchor="ctr"/>
-                </a:tc>
-                <a:tc>
-                  <a:txBody>
-                    <a:bodyPr/>
-                    <a:lstStyle/>
-                    <a:p>
-                      <a:pPr algn="l" latinLnBrk="1"/>
-                      <a:r>
-                        <a:rPr lang="en-US" altLang="ko-KR" sz="1600" dirty="0" smtClean="0"/>
-                        <a:t>API </a:t>
-                      </a:r>
-                      <a:r>
-                        <a:rPr lang="ko-KR" altLang="en-US" sz="1600" dirty="0" smtClean="0"/>
-                        <a:t>연동 테스트 및 발표 준비</a:t>
-                      </a:r>
-                      <a:endParaRPr lang="ko-KR" altLang="en-US" sz="1600" dirty="0">
-                        <a:latin typeface="+mn-ea"/>
-                        <a:ea typeface="+mn-ea"/>
-                      </a:endParaRPr>
-                    </a:p>
-                  </a:txBody>
-                  <a:tcPr anchor="ctr"/>
-                </a:tc>
-                <a:extLst>
-                  <a:ext uri="{0D108BD9-81ED-4DB2-BD59-A6C34878D82A}">
-                    <a16:rowId xmlns:a16="http://schemas.microsoft.com/office/drawing/2014/main" val="10003"/>
-                  </a:ext>
-                </a:extLst>
-              </a:tr>
-              <a:tr h="613730">
-                <a:tc>
-                  <a:txBody>
-                    <a:bodyPr/>
-                    <a:lstStyle/>
-                    <a:p>
-                      <a:pPr algn="ctr" latinLnBrk="1"/>
-                      <a:r>
-                        <a:rPr lang="en-US" altLang="ko-KR" sz="1600" dirty="0" smtClean="0"/>
-                        <a:t>4</a:t>
-                      </a:r>
-                      <a:r>
-                        <a:rPr lang="ko-KR" altLang="en-US" sz="1600" dirty="0" smtClean="0"/>
-                        <a:t>주차</a:t>
-                      </a:r>
-                      <a:endParaRPr lang="en-US" altLang="ko-KR" sz="1600" dirty="0" smtClean="0"/>
-                    </a:p>
-                    <a:p>
-                      <a:pPr algn="ctr" latinLnBrk="1"/>
-                      <a:r>
-                        <a:rPr lang="en-US" altLang="ko-KR" sz="1600" dirty="0" smtClean="0"/>
-                        <a:t>~5/31</a:t>
-                      </a:r>
-                      <a:endParaRPr lang="ko-KR" altLang="en-US" sz="1600" dirty="0">
-                        <a:latin typeface="+mn-ea"/>
-                        <a:ea typeface="+mn-ea"/>
-                      </a:endParaRPr>
-                    </a:p>
-                  </a:txBody>
-                  <a:tcPr anchor="ctr"/>
-                </a:tc>
-                <a:tc>
-                  <a:txBody>
-                    <a:bodyPr/>
-                    <a:lstStyle/>
-                    <a:p>
-                      <a:pPr algn="l" latinLnBrk="1"/>
-                      <a:r>
-                        <a:rPr lang="ko-KR" altLang="en-US" sz="1600" dirty="0" smtClean="0"/>
-                        <a:t>중간 시연 발표</a:t>
-                      </a:r>
-                      <a:r>
-                        <a:rPr lang="en-US" altLang="ko-KR" sz="1600" dirty="0" smtClean="0"/>
-                        <a:t>(5</a:t>
-                      </a:r>
-                      <a:r>
-                        <a:rPr lang="ko-KR" altLang="en-US" sz="1600" dirty="0" smtClean="0"/>
-                        <a:t>월 </a:t>
-                      </a:r>
-                      <a:r>
-                        <a:rPr lang="en-US" altLang="ko-KR" sz="1600" dirty="0" smtClean="0"/>
-                        <a:t>31</a:t>
-                      </a:r>
-                      <a:r>
-                        <a:rPr lang="ko-KR" altLang="en-US" sz="1600" dirty="0" smtClean="0"/>
-                        <a:t>일</a:t>
-                      </a:r>
-                      <a:r>
-                        <a:rPr lang="en-US" altLang="ko-KR" sz="1600" dirty="0" smtClean="0"/>
-                        <a:t>)</a:t>
-                      </a:r>
-                      <a:r>
-                        <a:rPr lang="en-US" altLang="ko-KR" sz="1600" baseline="0" dirty="0" smtClean="0"/>
-                        <a:t> </a:t>
-                      </a:r>
-                      <a:endParaRPr lang="ko-KR" altLang="en-US" sz="1600" b="0" dirty="0">
-                        <a:latin typeface="+mn-ea"/>
-                        <a:ea typeface="+mn-ea"/>
-                      </a:endParaRPr>
-                    </a:p>
-                  </a:txBody>
-                  <a:tcPr anchor="ctr"/>
-                </a:tc>
-                <a:extLst>
-                  <a:ext uri="{0D108BD9-81ED-4DB2-BD59-A6C34878D82A}">
-                    <a16:rowId xmlns:a16="http://schemas.microsoft.com/office/drawing/2014/main" val="10004"/>
-                  </a:ext>
-                </a:extLst>
-              </a:tr>
-              <a:tr h="613730">
-                <a:tc>
-                  <a:txBody>
-                    <a:bodyPr/>
-                    <a:lstStyle/>
-                    <a:p>
-                      <a:pPr algn="ctr" latinLnBrk="1"/>
-                      <a:r>
-                        <a:rPr lang="en-US" altLang="ko-KR" sz="1600" dirty="0" smtClean="0"/>
-                        <a:t>5</a:t>
-                      </a:r>
-                      <a:r>
-                        <a:rPr lang="ko-KR" altLang="en-US" sz="1600" dirty="0" smtClean="0"/>
-                        <a:t>주차</a:t>
-                      </a:r>
-                      <a:endParaRPr lang="en-US" altLang="ko-KR" sz="1600" dirty="0" smtClean="0"/>
-                    </a:p>
-                    <a:p>
-                      <a:pPr algn="ctr" latinLnBrk="1"/>
-                      <a:r>
-                        <a:rPr lang="en-US" altLang="ko-KR" sz="1600" dirty="0" smtClean="0"/>
-                        <a:t>~6/6</a:t>
-                      </a:r>
-                      <a:endParaRPr lang="ko-KR" altLang="en-US" sz="1600" dirty="0">
-                        <a:latin typeface="+mn-ea"/>
-                        <a:ea typeface="+mn-ea"/>
-                      </a:endParaRPr>
-                    </a:p>
-                  </a:txBody>
-                  <a:tcPr anchor="ctr"/>
-                </a:tc>
-                <a:tc>
-                  <a:txBody>
-                    <a:bodyPr/>
-                    <a:lstStyle/>
-                    <a:p>
-                      <a:pPr algn="l" latinLnBrk="1"/>
-                      <a:r>
-                        <a:rPr lang="ko-KR" altLang="en-US" sz="1600" dirty="0" smtClean="0"/>
-                        <a:t>실시간 연동을 위한 지역을 입력 할 수 있게 작성</a:t>
-                      </a:r>
-                      <a:endParaRPr lang="ko-KR" altLang="en-US" sz="1600" dirty="0">
-                        <a:latin typeface="+mn-ea"/>
-                        <a:ea typeface="+mn-ea"/>
-                      </a:endParaRPr>
-                    </a:p>
-                  </a:txBody>
-                  <a:tcPr anchor="ctr"/>
-                </a:tc>
-                <a:extLst>
-                  <a:ext uri="{0D108BD9-81ED-4DB2-BD59-A6C34878D82A}">
-                    <a16:rowId xmlns:a16="http://schemas.microsoft.com/office/drawing/2014/main" val="10005"/>
-                  </a:ext>
-                </a:extLst>
-              </a:tr>
-              <a:tr h="613730">
-                <a:tc>
-                  <a:txBody>
-                    <a:bodyPr/>
-                    <a:lstStyle/>
-                    <a:p>
-                      <a:pPr algn="ctr" latinLnBrk="1"/>
-                      <a:r>
-                        <a:rPr lang="en-US" altLang="ko-KR" sz="1600" dirty="0" smtClean="0"/>
-                        <a:t>6</a:t>
-                      </a:r>
-                      <a:r>
-                        <a:rPr lang="ko-KR" altLang="en-US" sz="1600" dirty="0" smtClean="0"/>
-                        <a:t>주차</a:t>
-                      </a:r>
-                      <a:endParaRPr lang="en-US" altLang="ko-KR" sz="1600" dirty="0" smtClean="0"/>
-                    </a:p>
-                    <a:p>
-                      <a:pPr algn="ctr" latinLnBrk="1"/>
-                      <a:r>
-                        <a:rPr lang="en-US" altLang="ko-KR" sz="1600" dirty="0" smtClean="0"/>
-                        <a:t>~6/13</a:t>
-                      </a:r>
-                      <a:endParaRPr lang="ko-KR" altLang="en-US" sz="1600" dirty="0">
-                        <a:latin typeface="+mn-ea"/>
-                        <a:ea typeface="+mn-ea"/>
-                      </a:endParaRPr>
-                    </a:p>
-                  </a:txBody>
-                  <a:tcPr anchor="ctr"/>
-                </a:tc>
-                <a:tc>
-                  <a:txBody>
-                    <a:bodyPr/>
-                    <a:lstStyle/>
-                    <a:p>
-                      <a:pPr algn="l" latinLnBrk="1"/>
-                      <a:r>
-                        <a:rPr lang="ko-KR" altLang="en-US" sz="1600" dirty="0" smtClean="0"/>
-                        <a:t>추가 계획 구현 및 적용 </a:t>
-                      </a:r>
-                      <a:r>
-                        <a:rPr lang="en-US" altLang="ko-KR" sz="1600" dirty="0" smtClean="0"/>
-                        <a:t>(GUI)</a:t>
-                      </a:r>
-                      <a:endParaRPr lang="ko-KR" altLang="en-US" sz="1600" dirty="0">
-                        <a:latin typeface="+mn-ea"/>
-                        <a:ea typeface="+mn-ea"/>
-                      </a:endParaRPr>
-                    </a:p>
-                  </a:txBody>
-                  <a:tcPr anchor="ctr"/>
-                </a:tc>
-                <a:extLst>
-                  <a:ext uri="{0D108BD9-81ED-4DB2-BD59-A6C34878D82A}">
-                    <a16:rowId xmlns:a16="http://schemas.microsoft.com/office/drawing/2014/main" val="10006"/>
-                  </a:ext>
-                </a:extLst>
-              </a:tr>
-              <a:tr h="613730">
-                <a:tc>
-                  <a:txBody>
-                    <a:bodyPr/>
-                    <a:lstStyle/>
-                    <a:p>
-                      <a:pPr algn="ctr" latinLnBrk="1"/>
-                      <a:r>
-                        <a:rPr lang="en-US" altLang="ko-KR" sz="1600" dirty="0" smtClean="0"/>
-                        <a:t>7</a:t>
-                      </a:r>
-                      <a:r>
-                        <a:rPr lang="ko-KR" altLang="en-US" sz="1600" dirty="0" smtClean="0"/>
-                        <a:t>주차</a:t>
-                      </a:r>
-                      <a:endParaRPr lang="en-US" altLang="ko-KR" sz="1600" dirty="0" smtClean="0"/>
-                    </a:p>
-                    <a:p>
-                      <a:pPr algn="ctr" latinLnBrk="1"/>
-                      <a:r>
-                        <a:rPr lang="en-US" altLang="ko-KR" sz="1600" dirty="0" smtClean="0"/>
-                        <a:t>~6/16</a:t>
-                      </a:r>
-                      <a:endParaRPr lang="ko-KR" altLang="en-US" sz="1600" dirty="0">
-                        <a:latin typeface="+mn-ea"/>
-                        <a:ea typeface="+mn-ea"/>
-                      </a:endParaRPr>
-                    </a:p>
-                  </a:txBody>
-                  <a:tcPr anchor="ctr"/>
-                </a:tc>
-                <a:tc>
-                  <a:txBody>
-                    <a:bodyPr/>
-                    <a:lstStyle/>
-                    <a:p>
-                      <a:pPr algn="l" latinLnBrk="1"/>
-                      <a:r>
-                        <a:rPr lang="ko-KR" altLang="en-US" sz="1600" dirty="0" smtClean="0"/>
-                        <a:t>버그 수정 및 최종 구현 발표 </a:t>
-                      </a:r>
-                      <a:r>
-                        <a:rPr lang="en-US" altLang="ko-KR" sz="1600" dirty="0" smtClean="0"/>
-                        <a:t>(6</a:t>
-                      </a:r>
-                      <a:r>
-                        <a:rPr lang="ko-KR" altLang="en-US" sz="1600" dirty="0" smtClean="0"/>
-                        <a:t>월 </a:t>
-                      </a:r>
-                      <a:r>
-                        <a:rPr lang="en-US" altLang="ko-KR" sz="1600" dirty="0" smtClean="0"/>
-                        <a:t>16</a:t>
-                      </a:r>
-                      <a:r>
-                        <a:rPr lang="ko-KR" altLang="en-US" sz="1600" dirty="0" smtClean="0"/>
-                        <a:t>일</a:t>
-                      </a:r>
-                      <a:r>
-                        <a:rPr lang="en-US" altLang="ko-KR" sz="1600" dirty="0" smtClean="0"/>
-                        <a:t>)</a:t>
-                      </a:r>
-                      <a:endParaRPr lang="ko-KR" altLang="en-US" sz="1600" dirty="0">
-                        <a:latin typeface="+mn-ea"/>
-                        <a:ea typeface="+mn-ea"/>
-                      </a:endParaRPr>
-                    </a:p>
-                  </a:txBody>
-                  <a:tcPr anchor="ctr"/>
-                </a:tc>
-                <a:extLst>
-                  <a:ext uri="{0D108BD9-81ED-4DB2-BD59-A6C34878D82A}">
-                    <a16:rowId xmlns:a16="http://schemas.microsoft.com/office/drawing/2014/main" val="10007"/>
-                  </a:ext>
-                </a:extLst>
-              </a:tr>
-            </a:tbl>
-          </a:graphicData>
-        </a:graphic>
-      </p:graphicFrame>
-    </p:spTree>
-    <p:extLst>
-      <p:ext uri="{BB962C8B-B14F-4D97-AF65-F5344CB8AC3E}">
-        <p14:creationId xmlns:p14="http://schemas.microsoft.com/office/powerpoint/2010/main" val="3870731552"/>
-      </p:ext>
-    </p:extLst>
-  </p:cSld>
-  <p:clrMapOvr>
-    <a:masterClrMapping/>
-  </p:clrMapOvr>
-  <p:timing>
-    <p:tnLst>
-      <p:par>
-        <p:cTn id="1" dur="indefinite" restart="never" nodeType="tmRoot">
-          <p:childTnLst>
-            <p:seq concurrent="1" nextAc="seek">
-              <p:cTn id="2" dur="indefinite" nodeType="mainSeq">
-                <p:childTnLst>
-                  <p:par>
-                    <p:cTn id="3" fill="hold">
-                      <p:stCondLst>
-                        <p:cond delay="indefinite"/>
-                      </p:stCondLst>
-                      <p:childTnLst>
-                        <p:par>
-                          <p:cTn id="4" fill="hold">
-                            <p:stCondLst>
-                              <p:cond delay="0"/>
-                            </p:stCondLst>
-                            <p:childTnLst>
-                              <p:par>
-                                <p:cTn id="5" presetID="14" presetClass="exit" presetSubtype="10" fill="hold" nodeType="clickEffect">
-                                  <p:stCondLst>
-                                    <p:cond delay="0"/>
-                                  </p:stCondLst>
-                                  <p:childTnLst>
-                                    <p:animEffect transition="out" filter="randombar(horizontal)">
-                                      <p:cBhvr>
-                                        <p:cTn id="6" dur="500"/>
-                                        <p:tgtEl>
-                                          <p:spTgt spid="19"/>
-                                        </p:tgtEl>
-                                      </p:cBhvr>
-                                    </p:animEffect>
-                                    <p:set>
-                                      <p:cBhvr>
-                                        <p:cTn id="7" dur="1" fill="hold">
-                                          <p:stCondLst>
-                                            <p:cond delay="499"/>
-                                          </p:stCondLst>
-                                        </p:cTn>
-                                        <p:tgtEl>
-                                          <p:spTgt spid="19"/>
-                                        </p:tgtEl>
-                                        <p:attrNameLst>
-                                          <p:attrName>style.visibility</p:attrName>
-                                        </p:attrNameLst>
-                                      </p:cBhvr>
-                                      <p:to>
-                                        <p:strVal val="hidden"/>
-                                      </p:to>
-                                    </p:set>
-                                  </p:childTnLst>
-                                </p:cTn>
-                              </p:par>
-                            </p:childTnLst>
-                          </p:cTn>
-                        </p:par>
-                      </p:childTnLst>
-                    </p:cTn>
-                  </p:par>
-                </p:childTnLst>
-              </p:cTn>
-              <p:prevCondLst>
-                <p:cond evt="onPrev" delay="0">
-                  <p:tgtEl>
-                    <p:sldTgt/>
-                  </p:tgtEl>
-                </p:cond>
-              </p:prevCondLst>
-              <p:nextCondLst>
-                <p:cond evt="onNext" delay="0">
-                  <p:tgtEl>
-                    <p:sldTgt/>
-                  </p:tgtEl>
-                </p:cond>
-              </p:nextCondLst>
-            </p:seq>
-          </p:childTnLst>
-        </p:cTn>
-      </p:par>
-    </p:tnLst>
-  </p:timing>
-</p:sld>
-</file>
-
-<file path=ppt/slides/slide13.xml><?xml version="1.0" encoding="utf-8"?>
-<p:sld xmlns:a="http://schemas.openxmlformats.org/drawingml/2006/main" xmlns:r="http://schemas.openxmlformats.org/officeDocument/2006/relationships" xmlns:p="http://schemas.openxmlformats.org/presentationml/2006/main">
-  <p:cSld>
-    <p:spTree>
-      <p:nvGrpSpPr>
-        <p:cNvPr id="1" name=""/>
-        <p:cNvGrpSpPr/>
-        <p:nvPr/>
-      </p:nvGrpSpPr>
-      <p:grpSpPr>
-        <a:xfrm>
-          <a:off x="0" y="0"/>
-          <a:ext cx="0" cy="0"/>
-          <a:chOff x="0" y="0"/>
-          <a:chExt cx="0" cy="0"/>
-        </a:xfrm>
-      </p:grpSpPr>
-      <p:cxnSp>
-        <p:nvCxnSpPr>
-          <p:cNvPr id="16" name="직선 연결선 15"/>
-          <p:cNvCxnSpPr/>
-          <p:nvPr/>
-        </p:nvCxnSpPr>
-        <p:spPr>
-          <a:xfrm>
-            <a:off x="0" y="2438400"/>
-            <a:ext cx="0" cy="106680"/>
-          </a:xfrm>
-          <a:prstGeom prst="line">
-            <a:avLst/>
-          </a:prstGeom>
-          <a:ln>
-            <a:solidFill>
-              <a:schemeClr val="bg1"/>
-            </a:solidFill>
-          </a:ln>
-        </p:spPr>
-        <p:style>
-          <a:lnRef idx="1">
-            <a:schemeClr val="accent1"/>
-          </a:lnRef>
-          <a:fillRef idx="0">
-            <a:schemeClr val="accent1"/>
-          </a:fillRef>
-          <a:effectRef idx="0">
-            <a:schemeClr val="accent1"/>
-          </a:effectRef>
-          <a:fontRef idx="minor">
-            <a:schemeClr val="tx1"/>
-          </a:fontRef>
-        </p:style>
-      </p:cxnSp>
-      <p:cxnSp>
-        <p:nvCxnSpPr>
-          <p:cNvPr id="17" name="직선 연결선 16"/>
-          <p:cNvCxnSpPr/>
-          <p:nvPr/>
-        </p:nvCxnSpPr>
-        <p:spPr>
-          <a:xfrm flipH="1">
-            <a:off x="0" y="2545080"/>
-            <a:ext cx="108000" cy="0"/>
-          </a:xfrm>
-          <a:prstGeom prst="line">
-            <a:avLst/>
-          </a:prstGeom>
-          <a:ln>
-            <a:solidFill>
-              <a:schemeClr val="bg1"/>
-            </a:solidFill>
-          </a:ln>
-        </p:spPr>
-        <p:style>
-          <a:lnRef idx="1">
-            <a:schemeClr val="accent1"/>
-          </a:lnRef>
-          <a:fillRef idx="0">
-            <a:schemeClr val="accent1"/>
-          </a:fillRef>
-          <a:effectRef idx="0">
-            <a:schemeClr val="accent1"/>
-          </a:effectRef>
-          <a:fontRef idx="minor">
-            <a:schemeClr val="tx1"/>
-          </a:fontRef>
-        </p:style>
-      </p:cxnSp>
-      <p:sp>
-        <p:nvSpPr>
-          <p:cNvPr id="22" name="직사각형 21"/>
-          <p:cNvSpPr/>
-          <p:nvPr/>
-        </p:nvSpPr>
-        <p:spPr>
-          <a:xfrm>
-            <a:off x="0" y="0"/>
-            <a:ext cx="482600" cy="6858000"/>
-          </a:xfrm>
-          <a:prstGeom prst="rect">
-            <a:avLst/>
-          </a:prstGeom>
-          <a:solidFill>
-            <a:schemeClr val="bg1">
-              <a:lumMod val="85000"/>
-            </a:schemeClr>
-          </a:solidFill>
-          <a:ln>
-            <a:noFill/>
-          </a:ln>
-        </p:spPr>
-        <p:style>
-          <a:lnRef idx="2">
-            <a:schemeClr val="accent1">
-              <a:shade val="50000"/>
-            </a:schemeClr>
-          </a:lnRef>
-          <a:fillRef idx="1">
-            <a:schemeClr val="accent1"/>
-          </a:fillRef>
-          <a:effectRef idx="0">
-            <a:schemeClr val="accent1"/>
-          </a:effectRef>
-          <a:fontRef idx="minor">
-            <a:schemeClr val="lt1"/>
-          </a:fontRef>
-        </p:style>
-        <p:txBody>
-          <a:bodyPr rtlCol="0" anchor="ctr"/>
-          <a:lstStyle/>
-          <a:p>
-            <a:pPr algn="ctr"/>
-            <a:endParaRPr lang="ko-KR" altLang="en-US"/>
-          </a:p>
-        </p:txBody>
-      </p:sp>
-      <p:sp>
-        <p:nvSpPr>
-          <p:cNvPr id="23" name="직사각형 22"/>
-          <p:cNvSpPr/>
-          <p:nvPr/>
-        </p:nvSpPr>
-        <p:spPr>
-          <a:xfrm>
-            <a:off x="0" y="563880"/>
-            <a:ext cx="482600" cy="482400"/>
-          </a:xfrm>
-          <a:prstGeom prst="rect">
-            <a:avLst/>
-          </a:prstGeom>
-          <a:solidFill>
-            <a:srgbClr val="213540"/>
-          </a:solidFill>
-          <a:ln>
-            <a:noFill/>
-          </a:ln>
-        </p:spPr>
-        <p:style>
-          <a:lnRef idx="2">
-            <a:schemeClr val="accent1">
-              <a:shade val="50000"/>
-            </a:schemeClr>
-          </a:lnRef>
-          <a:fillRef idx="1">
-            <a:schemeClr val="accent1"/>
-          </a:fillRef>
-          <a:effectRef idx="0">
-            <a:schemeClr val="accent1"/>
-          </a:effectRef>
-          <a:fontRef idx="minor">
-            <a:schemeClr val="lt1"/>
-          </a:fontRef>
-        </p:style>
-        <p:txBody>
-          <a:bodyPr rtlCol="0" anchor="ctr"/>
-          <a:lstStyle/>
-          <a:p>
-            <a:pPr algn="ctr"/>
-            <a:endParaRPr lang="ko-KR" altLang="en-US"/>
-          </a:p>
-        </p:txBody>
-      </p:sp>
-      <p:sp>
-        <p:nvSpPr>
-          <p:cNvPr id="26" name="TextBox 25"/>
-          <p:cNvSpPr txBox="1"/>
-          <p:nvPr/>
-        </p:nvSpPr>
-        <p:spPr>
-          <a:xfrm>
-            <a:off x="79236" y="620414"/>
-            <a:ext cx="324128" cy="369332"/>
-          </a:xfrm>
-          <a:prstGeom prst="rect">
-            <a:avLst/>
-          </a:prstGeom>
-          <a:noFill/>
-        </p:spPr>
-        <p:txBody>
-          <a:bodyPr wrap="none" rtlCol="0">
-            <a:spAutoFit/>
-          </a:bodyPr>
-          <a:lstStyle/>
-          <a:p>
-            <a:r>
-              <a:rPr lang="en-US" altLang="ko-KR" b="1" dirty="0" smtClean="0">
-                <a:solidFill>
-                  <a:schemeClr val="bg1"/>
-                </a:solidFill>
-              </a:rPr>
-              <a:t>1</a:t>
-            </a:r>
-            <a:endParaRPr lang="ko-KR" altLang="en-US" b="1" dirty="0">
-              <a:solidFill>
-                <a:schemeClr val="bg1"/>
-              </a:solidFill>
-            </a:endParaRPr>
-          </a:p>
-        </p:txBody>
-      </p:sp>
-      <p:grpSp>
-        <p:nvGrpSpPr>
-          <p:cNvPr id="28" name="그룹 27"/>
-          <p:cNvGrpSpPr/>
-          <p:nvPr/>
-        </p:nvGrpSpPr>
-        <p:grpSpPr>
-          <a:xfrm>
-            <a:off x="0" y="1046280"/>
-            <a:ext cx="482600" cy="482400"/>
-            <a:chOff x="0" y="563880"/>
-            <a:chExt cx="482600" cy="482400"/>
-          </a:xfrm>
-        </p:grpSpPr>
-        <p:sp>
-          <p:nvSpPr>
-            <p:cNvPr id="29" name="직사각형 28"/>
-            <p:cNvSpPr/>
-            <p:nvPr/>
-          </p:nvSpPr>
-          <p:spPr>
-            <a:xfrm>
-              <a:off x="0" y="563880"/>
-              <a:ext cx="482600" cy="482400"/>
-            </a:xfrm>
-            <a:prstGeom prst="rect">
-              <a:avLst/>
-            </a:prstGeom>
-            <a:solidFill>
-              <a:srgbClr val="2B4682"/>
-            </a:solidFill>
-            <a:ln>
-              <a:noFill/>
-            </a:ln>
-          </p:spPr>
-          <p:style>
-            <a:lnRef idx="2">
-              <a:schemeClr val="accent1">
-                <a:shade val="50000"/>
-              </a:schemeClr>
-            </a:lnRef>
-            <a:fillRef idx="1">
-              <a:schemeClr val="accent1"/>
-            </a:fillRef>
-            <a:effectRef idx="0">
-              <a:schemeClr val="accent1"/>
-            </a:effectRef>
-            <a:fontRef idx="minor">
-              <a:schemeClr val="lt1"/>
-            </a:fontRef>
-          </p:style>
-          <p:txBody>
-            <a:bodyPr rtlCol="0" anchor="ctr"/>
-            <a:lstStyle/>
-            <a:p>
-              <a:pPr algn="ctr"/>
-              <a:endParaRPr lang="ko-KR" altLang="en-US"/>
-            </a:p>
-          </p:txBody>
-        </p:sp>
-        <p:sp>
-          <p:nvSpPr>
-            <p:cNvPr id="30" name="TextBox 29"/>
-            <p:cNvSpPr txBox="1"/>
-            <p:nvPr/>
-          </p:nvSpPr>
-          <p:spPr>
-            <a:xfrm>
-              <a:off x="79236" y="620414"/>
-              <a:ext cx="324128" cy="369332"/>
-            </a:xfrm>
-            <a:prstGeom prst="rect">
-              <a:avLst/>
-            </a:prstGeom>
-            <a:noFill/>
-          </p:spPr>
-          <p:txBody>
-            <a:bodyPr wrap="none" rtlCol="0">
-              <a:spAutoFit/>
-            </a:bodyPr>
-            <a:lstStyle/>
-            <a:p>
-              <a:r>
-                <a:rPr lang="en-US" altLang="ko-KR" b="1" dirty="0" smtClean="0">
-                  <a:solidFill>
-                    <a:schemeClr val="bg1"/>
-                  </a:solidFill>
-                </a:rPr>
-                <a:t>2</a:t>
-              </a:r>
-              <a:endParaRPr lang="ko-KR" altLang="en-US" b="1" dirty="0">
-                <a:solidFill>
-                  <a:schemeClr val="bg1"/>
-                </a:solidFill>
-              </a:endParaRPr>
-            </a:p>
-          </p:txBody>
-        </p:sp>
-      </p:grpSp>
-      <p:grpSp>
-        <p:nvGrpSpPr>
-          <p:cNvPr id="31" name="그룹 30"/>
-          <p:cNvGrpSpPr/>
-          <p:nvPr/>
-        </p:nvGrpSpPr>
-        <p:grpSpPr>
-          <a:xfrm>
-            <a:off x="0" y="1528680"/>
-            <a:ext cx="482600" cy="482400"/>
-            <a:chOff x="0" y="563880"/>
-            <a:chExt cx="482600" cy="482400"/>
-          </a:xfrm>
-        </p:grpSpPr>
-        <p:sp>
-          <p:nvSpPr>
-            <p:cNvPr id="32" name="직사각형 31"/>
-            <p:cNvSpPr/>
-            <p:nvPr/>
-          </p:nvSpPr>
-          <p:spPr>
-            <a:xfrm>
-              <a:off x="0" y="563880"/>
-              <a:ext cx="482600" cy="482400"/>
-            </a:xfrm>
-            <a:prstGeom prst="rect">
-              <a:avLst/>
-            </a:prstGeom>
-            <a:solidFill>
-              <a:srgbClr val="74C478"/>
-            </a:solidFill>
-            <a:ln>
-              <a:noFill/>
-            </a:ln>
-          </p:spPr>
-          <p:style>
-            <a:lnRef idx="2">
-              <a:schemeClr val="accent1">
-                <a:shade val="50000"/>
-              </a:schemeClr>
-            </a:lnRef>
-            <a:fillRef idx="1">
-              <a:schemeClr val="accent1"/>
-            </a:fillRef>
-            <a:effectRef idx="0">
-              <a:schemeClr val="accent1"/>
-            </a:effectRef>
-            <a:fontRef idx="minor">
-              <a:schemeClr val="lt1"/>
-            </a:fontRef>
-          </p:style>
-          <p:txBody>
-            <a:bodyPr rtlCol="0" anchor="ctr"/>
-            <a:lstStyle/>
-            <a:p>
-              <a:pPr algn="ctr"/>
-              <a:endParaRPr lang="ko-KR" altLang="en-US"/>
-            </a:p>
-          </p:txBody>
-        </p:sp>
-        <p:sp>
-          <p:nvSpPr>
-            <p:cNvPr id="33" name="TextBox 32"/>
-            <p:cNvSpPr txBox="1"/>
-            <p:nvPr/>
-          </p:nvSpPr>
-          <p:spPr>
-            <a:xfrm>
-              <a:off x="79236" y="620414"/>
-              <a:ext cx="324128" cy="369332"/>
-            </a:xfrm>
-            <a:prstGeom prst="rect">
-              <a:avLst/>
-            </a:prstGeom>
-            <a:noFill/>
-          </p:spPr>
-          <p:txBody>
-            <a:bodyPr wrap="none" rtlCol="0">
-              <a:spAutoFit/>
-            </a:bodyPr>
-            <a:lstStyle/>
-            <a:p>
-              <a:r>
-                <a:rPr lang="en-US" altLang="ko-KR" b="1" dirty="0" smtClean="0">
-                  <a:solidFill>
-                    <a:schemeClr val="bg1"/>
-                  </a:solidFill>
-                </a:rPr>
-                <a:t>3</a:t>
-              </a:r>
-              <a:endParaRPr lang="ko-KR" altLang="en-US" b="1" dirty="0">
-                <a:solidFill>
-                  <a:schemeClr val="bg1"/>
-                </a:solidFill>
-              </a:endParaRPr>
-            </a:p>
-          </p:txBody>
-        </p:sp>
-      </p:grpSp>
-      <p:sp>
-        <p:nvSpPr>
-          <p:cNvPr id="35" name="직사각형 34"/>
-          <p:cNvSpPr/>
-          <p:nvPr/>
-        </p:nvSpPr>
-        <p:spPr>
-          <a:xfrm>
-            <a:off x="0" y="2011080"/>
-            <a:ext cx="2520000" cy="482400"/>
-          </a:xfrm>
-          <a:prstGeom prst="rect">
-            <a:avLst/>
-          </a:prstGeom>
-          <a:solidFill>
-            <a:srgbClr val="FFD44E"/>
-          </a:solidFill>
-          <a:ln>
-            <a:noFill/>
-          </a:ln>
-        </p:spPr>
-        <p:style>
-          <a:lnRef idx="2">
-            <a:schemeClr val="accent1">
-              <a:shade val="50000"/>
-            </a:schemeClr>
-          </a:lnRef>
-          <a:fillRef idx="1">
-            <a:schemeClr val="accent1"/>
-          </a:fillRef>
-          <a:effectRef idx="0">
-            <a:schemeClr val="accent1"/>
-          </a:effectRef>
-          <a:fontRef idx="minor">
-            <a:schemeClr val="lt1"/>
-          </a:fontRef>
-        </p:style>
-        <p:txBody>
-          <a:bodyPr rtlCol="0" anchor="ctr"/>
-          <a:lstStyle/>
-          <a:p>
-            <a:pPr algn="ctr"/>
-            <a:r>
-              <a:rPr lang="ko-KR" altLang="en-US" dirty="0" smtClean="0"/>
-              <a:t>역할 분담</a:t>
-            </a:r>
-            <a:endParaRPr lang="ko-KR" altLang="en-US" dirty="0"/>
-          </a:p>
-        </p:txBody>
-      </p:sp>
-      <p:sp>
-        <p:nvSpPr>
-          <p:cNvPr id="36" name="TextBox 35"/>
-          <p:cNvSpPr txBox="1"/>
-          <p:nvPr/>
-        </p:nvSpPr>
-        <p:spPr>
-          <a:xfrm>
-            <a:off x="79236" y="2067614"/>
-            <a:ext cx="324128" cy="369332"/>
-          </a:xfrm>
-          <a:prstGeom prst="rect">
-            <a:avLst/>
-          </a:prstGeom>
-          <a:noFill/>
-        </p:spPr>
-        <p:txBody>
-          <a:bodyPr wrap="none" rtlCol="0">
-            <a:spAutoFit/>
-          </a:bodyPr>
-          <a:lstStyle/>
-          <a:p>
-            <a:r>
-              <a:rPr lang="en-US" altLang="ko-KR" b="1" dirty="0" smtClean="0">
-                <a:solidFill>
-                  <a:schemeClr val="bg1"/>
-                </a:solidFill>
-              </a:rPr>
-              <a:t>4</a:t>
-            </a:r>
-            <a:endParaRPr lang="ko-KR" altLang="en-US" b="1" dirty="0">
-              <a:solidFill>
-                <a:schemeClr val="bg1"/>
-              </a:solidFill>
-            </a:endParaRPr>
-          </a:p>
-        </p:txBody>
-      </p:sp>
-      <p:graphicFrame>
-        <p:nvGraphicFramePr>
-          <p:cNvPr id="2" name="표 1"/>
-          <p:cNvGraphicFramePr>
-            <a:graphicFrameLocks noGrp="1"/>
-          </p:cNvGraphicFramePr>
-          <p:nvPr>
-            <p:extLst>
-              <p:ext uri="{D42A27DB-BD31-4B8C-83A1-F6EECF244321}">
-                <p14:modId xmlns:p14="http://schemas.microsoft.com/office/powerpoint/2010/main" val="898348865"/>
+                <p14:modId xmlns:p14="http://schemas.microsoft.com/office/powerpoint/2010/main" val="1041846722"/>
               </p:ext>
             </p:extLst>
           </p:nvPr>
@@ -7468,21 +5404,21 @@
                 <a:gridCol w="1305943">
                   <a:extLst>
                     <a:ext uri="{9D8B030D-6E8A-4147-A177-3AD203B41FA5}">
-                      <a16:colId xmlns:a16="http://schemas.microsoft.com/office/drawing/2014/main" val="2871081070"/>
+                      <a16:colId xmlns:a16="http://schemas.microsoft.com/office/drawing/2014/main" xmlns="" val="2871081070"/>
                     </a:ext>
                   </a:extLst>
                 </a:gridCol>
                 <a:gridCol w="4270542">
                   <a:extLst>
                     <a:ext uri="{9D8B030D-6E8A-4147-A177-3AD203B41FA5}">
-                      <a16:colId xmlns:a16="http://schemas.microsoft.com/office/drawing/2014/main" val="4012674561"/>
+                      <a16:colId xmlns:a16="http://schemas.microsoft.com/office/drawing/2014/main" xmlns="" val="4012674561"/>
                     </a:ext>
                   </a:extLst>
                 </a:gridCol>
                 <a:gridCol w="2788243">
                   <a:extLst>
                     <a:ext uri="{9D8B030D-6E8A-4147-A177-3AD203B41FA5}">
-                      <a16:colId xmlns:a16="http://schemas.microsoft.com/office/drawing/2014/main" val="1226198807"/>
+                      <a16:colId xmlns:a16="http://schemas.microsoft.com/office/drawing/2014/main" xmlns="" val="1226198807"/>
                     </a:ext>
                   </a:extLst>
                 </a:gridCol>
@@ -7531,7 +5467,7 @@
                 </a:tc>
                 <a:extLst>
                   <a:ext uri="{0D108BD9-81ED-4DB2-BD59-A6C34878D82A}">
-                    <a16:rowId xmlns:a16="http://schemas.microsoft.com/office/drawing/2014/main" val="1697789498"/>
+                    <a16:rowId xmlns:a16="http://schemas.microsoft.com/office/drawing/2014/main" xmlns="" val="1697789498"/>
                   </a:ext>
                 </a:extLst>
               </a:tr>
@@ -7805,7 +5741,7 @@
                 </a:tc>
                 <a:extLst>
                   <a:ext uri="{0D108BD9-81ED-4DB2-BD59-A6C34878D82A}">
-                    <a16:rowId xmlns:a16="http://schemas.microsoft.com/office/drawing/2014/main" val="2347124872"/>
+                    <a16:rowId xmlns:a16="http://schemas.microsoft.com/office/drawing/2014/main" xmlns="" val="2347124872"/>
                   </a:ext>
                 </a:extLst>
               </a:tr>
@@ -7913,7 +5849,7 @@
                 </a:tc>
                 <a:extLst>
                   <a:ext uri="{0D108BD9-81ED-4DB2-BD59-A6C34878D82A}">
-                    <a16:rowId xmlns:a16="http://schemas.microsoft.com/office/drawing/2014/main" val="3776552569"/>
+                    <a16:rowId xmlns:a16="http://schemas.microsoft.com/office/drawing/2014/main" xmlns="" val="3776552569"/>
                   </a:ext>
                 </a:extLst>
               </a:tr>
@@ -7924,7 +5860,7 @@
     </p:spTree>
     <p:extLst>
       <p:ext uri="{BB962C8B-B14F-4D97-AF65-F5344CB8AC3E}">
-        <p14:creationId xmlns:p14="http://schemas.microsoft.com/office/powerpoint/2010/main" val="946738882"/>
+        <p14:creationId xmlns:p14="http://schemas.microsoft.com/office/powerpoint/2010/main" val="3870731552"/>
       </p:ext>
     </p:extLst>
   </p:cSld>
@@ -7941,7 +5877,7 @@
 </p:sld>
 </file>
 
-<file path=ppt/slides/slide14.xml><?xml version="1.0" encoding="utf-8"?>
+<file path=ppt/slides/slide13.xml><?xml version="1.0" encoding="utf-8"?>
 <p:sld xmlns:a="http://schemas.openxmlformats.org/drawingml/2006/main" xmlns:r="http://schemas.openxmlformats.org/officeDocument/2006/relationships" xmlns:p="http://schemas.openxmlformats.org/presentationml/2006/main">
   <p:cSld>
     <p:spTree>
@@ -9047,8 +6983,8 @@
         </p:nvSpPr>
         <p:spPr>
           <a:xfrm>
-            <a:off x="3086100" y="1334621"/>
-            <a:ext cx="7067550" cy="3323987"/>
+            <a:off x="3077862" y="1903043"/>
+            <a:ext cx="7067550" cy="2400657"/>
           </a:xfrm>
           <a:prstGeom prst="rect">
             <a:avLst/>
@@ -9076,26 +7012,16 @@
             <a:endParaRPr lang="en-US" altLang="ko-KR" sz="3000" dirty="0" smtClean="0"/>
           </a:p>
           <a:p>
-            <a:endParaRPr lang="en-US" altLang="ko-KR" sz="3000" dirty="0" smtClean="0"/>
-          </a:p>
-          <a:p>
+            <a:endParaRPr lang="en-US" altLang="ko-KR" sz="3000" dirty="0"/>
+          </a:p>
+          <a:p>
+            <a:r>
+              <a:rPr lang="en-US" altLang="ko-KR" sz="3000" dirty="0"/>
+              <a:t>2</a:t>
+            </a:r>
             <a:r>
               <a:rPr lang="en-US" altLang="ko-KR" sz="3000" dirty="0" smtClean="0"/>
-              <a:t>2. </a:t>
-            </a:r>
-            <a:r>
-              <a:rPr lang="ko-KR" altLang="en-US" sz="3000" dirty="0" smtClean="0"/>
-              <a:t>개발 일정</a:t>
-            </a:r>
-            <a:endParaRPr lang="en-US" altLang="ko-KR" sz="3000" dirty="0" smtClean="0"/>
-          </a:p>
-          <a:p>
-            <a:endParaRPr lang="en-US" altLang="ko-KR" sz="3000" dirty="0"/>
-          </a:p>
-          <a:p>
-            <a:r>
-              <a:rPr lang="en-US" altLang="ko-KR" sz="3000" dirty="0" smtClean="0"/>
-              <a:t>3. </a:t>
+              <a:t>. </a:t>
             </a:r>
             <a:r>
               <a:rPr lang="ko-KR" altLang="en-US" sz="3000" dirty="0" smtClean="0"/>
@@ -9108,8 +7034,12 @@
           </a:p>
           <a:p>
             <a:r>
+              <a:rPr lang="en-US" altLang="ko-KR" sz="3000" dirty="0"/>
+              <a:t>3</a:t>
+            </a:r>
+            <a:r>
               <a:rPr lang="en-US" altLang="ko-KR" sz="3000" dirty="0" smtClean="0"/>
-              <a:t>4. </a:t>
+              <a:t>. </a:t>
             </a:r>
             <a:r>
               <a:rPr lang="ko-KR" altLang="en-US" sz="3000" dirty="0" smtClean="0"/>
@@ -13970,7 +11900,7 @@
   <a:themeElements>
     <a:clrScheme name="청록색">
       <a:dk1>
-        <a:sysClr val="windowText" lastClr="565656"/>
+        <a:sysClr val="windowText" lastClr="000000"/>
       </a:dk1>
       <a:lt1>
         <a:sysClr val="window" lastClr="FFFFFF"/>
@@ -14224,7 +12154,7 @@
   <a:extraClrSchemeLst/>
   <a:extLst>
     <a:ext uri="{05A4C25C-085E-4340-85A3-A5531E510DB2}">
-      <thm15:themeFamily xmlns:thm15="http://schemas.microsoft.com/office/thememl/2012/main" name="default theme" id="{63D97651-9F09-4B96-A8BE-BCF06120534C}" vid="{32553D14-C644-4D00-8AF9-F760326BB16C}"/>
+      <thm15:themeFamily xmlns:thm15="http://schemas.microsoft.com/office/thememl/2012/main" xmlns="" name="default theme" id="{63D97651-9F09-4B96-A8BE-BCF06120534C}" vid="{32553D14-C644-4D00-8AF9-F760326BB16C}"/>
     </a:ext>
   </a:extLst>
 </a:theme>

</xml_diff>